<commit_message>
Added Roman Zavodskikh notes to class06
</commit_message>
<xml_diff>
--- a/talks/src/class06.pptx
+++ b/talks/src/class06.pptx
@@ -128,6 +128,11 @@
       </a:defRPr>
     </a:lvl9pPr>
   </p:defaultTextStyle>
+  <p:extLst>
+    <p:ext uri="{EFAFB233-063F-42B5-8137-9DF3F51BA10A}">
+      <p15:sldGuideLst xmlns:p15="http://schemas.microsoft.com/office/powerpoint/2012/main"/>
+    </p:ext>
+  </p:extLst>
 </p:presentation>
 </file>
 
@@ -213,7 +218,7 @@
           <a:p>
             <a:fld id="{0D0D5F6C-FBA3-9241-B8B2-B12256CD9D3B}" type="datetimeFigureOut">
               <a:rPr lang="ru-RU" smtClean="0"/>
-              <a:t>11.11.2018</a:t>
+              <a:t>14.10.2019</a:t>
             </a:fld>
             <a:endParaRPr lang="ru-RU"/>
           </a:p>
@@ -2962,7 +2967,7 @@
           <a:p>
             <a:fld id="{98B1E46B-A091-1A41-AEA5-9119026F30DB}" type="datetimeFigureOut">
               <a:rPr lang="ru-RU" smtClean="0"/>
-              <a:t>11.11.2018</a:t>
+              <a:t>14.10.2019</a:t>
             </a:fld>
             <a:endParaRPr lang="ru-RU"/>
           </a:p>
@@ -3162,7 +3167,7 @@
           <a:p>
             <a:fld id="{98B1E46B-A091-1A41-AEA5-9119026F30DB}" type="datetimeFigureOut">
               <a:rPr lang="ru-RU" smtClean="0"/>
-              <a:t>11.11.2018</a:t>
+              <a:t>14.10.2019</a:t>
             </a:fld>
             <a:endParaRPr lang="ru-RU"/>
           </a:p>
@@ -3372,7 +3377,7 @@
           <a:p>
             <a:fld id="{98B1E46B-A091-1A41-AEA5-9119026F30DB}" type="datetimeFigureOut">
               <a:rPr lang="ru-RU" smtClean="0"/>
-              <a:t>11.11.2018</a:t>
+              <a:t>14.10.2019</a:t>
             </a:fld>
             <a:endParaRPr lang="ru-RU"/>
           </a:p>
@@ -3572,7 +3577,7 @@
           <a:p>
             <a:fld id="{98B1E46B-A091-1A41-AEA5-9119026F30DB}" type="datetimeFigureOut">
               <a:rPr lang="ru-RU" smtClean="0"/>
-              <a:t>11.11.2018</a:t>
+              <a:t>14.10.2019</a:t>
             </a:fld>
             <a:endParaRPr lang="ru-RU"/>
           </a:p>
@@ -3848,7 +3853,7 @@
           <a:p>
             <a:fld id="{98B1E46B-A091-1A41-AEA5-9119026F30DB}" type="datetimeFigureOut">
               <a:rPr lang="ru-RU" smtClean="0"/>
-              <a:t>11.11.2018</a:t>
+              <a:t>14.10.2019</a:t>
             </a:fld>
             <a:endParaRPr lang="ru-RU"/>
           </a:p>
@@ -4116,7 +4121,7 @@
           <a:p>
             <a:fld id="{98B1E46B-A091-1A41-AEA5-9119026F30DB}" type="datetimeFigureOut">
               <a:rPr lang="ru-RU" smtClean="0"/>
-              <a:t>11.11.2018</a:t>
+              <a:t>14.10.2019</a:t>
             </a:fld>
             <a:endParaRPr lang="ru-RU"/>
           </a:p>
@@ -4531,7 +4536,7 @@
           <a:p>
             <a:fld id="{98B1E46B-A091-1A41-AEA5-9119026F30DB}" type="datetimeFigureOut">
               <a:rPr lang="ru-RU" smtClean="0"/>
-              <a:t>11.11.2018</a:t>
+              <a:t>14.10.2019</a:t>
             </a:fld>
             <a:endParaRPr lang="ru-RU"/>
           </a:p>
@@ -4673,7 +4678,7 @@
           <a:p>
             <a:fld id="{98B1E46B-A091-1A41-AEA5-9119026F30DB}" type="datetimeFigureOut">
               <a:rPr lang="ru-RU" smtClean="0"/>
-              <a:t>11.11.2018</a:t>
+              <a:t>14.10.2019</a:t>
             </a:fld>
             <a:endParaRPr lang="ru-RU"/>
           </a:p>
@@ -4786,7 +4791,7 @@
           <a:p>
             <a:fld id="{98B1E46B-A091-1A41-AEA5-9119026F30DB}" type="datetimeFigureOut">
               <a:rPr lang="ru-RU" smtClean="0"/>
-              <a:t>11.11.2018</a:t>
+              <a:t>14.10.2019</a:t>
             </a:fld>
             <a:endParaRPr lang="ru-RU"/>
           </a:p>
@@ -5099,7 +5104,7 @@
           <a:p>
             <a:fld id="{98B1E46B-A091-1A41-AEA5-9119026F30DB}" type="datetimeFigureOut">
               <a:rPr lang="ru-RU" smtClean="0"/>
-              <a:t>11.11.2018</a:t>
+              <a:t>14.10.2019</a:t>
             </a:fld>
             <a:endParaRPr lang="ru-RU"/>
           </a:p>
@@ -5388,7 +5393,7 @@
           <a:p>
             <a:fld id="{98B1E46B-A091-1A41-AEA5-9119026F30DB}" type="datetimeFigureOut">
               <a:rPr lang="ru-RU" smtClean="0"/>
-              <a:t>11.11.2018</a:t>
+              <a:t>14.10.2019</a:t>
             </a:fld>
             <a:endParaRPr lang="ru-RU"/>
           </a:p>
@@ -5631,7 +5636,7 @@
           <a:p>
             <a:fld id="{98B1E46B-A091-1A41-AEA5-9119026F30DB}" type="datetimeFigureOut">
               <a:rPr lang="ru-RU" smtClean="0"/>
-              <a:t>11.11.2018</a:t>
+              <a:t>14.10.2019</a:t>
             </a:fld>
             <a:endParaRPr lang="ru-RU"/>
           </a:p>
@@ -6276,6 +6281,13 @@
   <p:clrMapOvr>
     <a:masterClrMapping/>
   </p:clrMapOvr>
+  <p:timing>
+    <p:tnLst>
+      <p:par>
+        <p:cTn id="1" dur="indefinite" restart="never" nodeType="tmRoot"/>
+      </p:par>
+    </p:tnLst>
+  </p:timing>
 </p:sld>
 </file>
 
@@ -7118,8 +7130,8 @@
           </a:graphicData>
         </a:graphic>
       </p:graphicFrame>
-      <mc:AlternateContent xmlns:mc="http://schemas.openxmlformats.org/markup-compatibility/2006">
-        <mc:Choice xmlns:a14="http://schemas.microsoft.com/office/drawing/2010/main" Requires="a14">
+      <mc:AlternateContent xmlns:mc="http://schemas.openxmlformats.org/markup-compatibility/2006" xmlns:a14="http://schemas.microsoft.com/office/drawing/2010/main">
+        <mc:Choice Requires="a14">
           <p:graphicFrame>
             <p:nvGraphicFramePr>
               <p:cNvPr id="2" name="Table 1"/>
@@ -7481,7 +7493,7 @@
             </a:graphic>
           </p:graphicFrame>
         </mc:Choice>
-        <mc:Fallback>
+        <mc:Fallback xmlns="">
           <p:graphicFrame>
             <p:nvGraphicFramePr>
               <p:cNvPr id="2" name="Table 1"/>
@@ -7946,7 +7958,7 @@
               <p:nvPr>
                 <p:extLst>
                   <p:ext uri="{D42A27DB-BD31-4B8C-83A1-F6EECF244321}">
-                    <p14:modId xmlns:p14="http://schemas.microsoft.com/office/powerpoint/2010/main" val="320598462"/>
+                    <p14:modId xmlns:p14="http://schemas.microsoft.com/office/powerpoint/2010/main" val="2210108017"/>
                   </p:ext>
                 </p:extLst>
               </p:nvPr>
@@ -8296,7 +8308,23 @@
                           </a:br>
                           <a:r>
                             <a:rPr lang="ru-RU" baseline="0" dirty="0"/>
-                            <a:t>поэтому переписывается сильно меньшая часть дерева, чем случае </a:t>
+                            <a:t>поэтому переписывается сильно меньшая часть дерева, </a:t>
+                          </a:r>
+                          <a:r>
+                            <a:rPr lang="ru-RU" baseline="0" dirty="0" smtClean="0"/>
+                            <a:t>чем</a:t>
+                          </a:r>
+                          <a:r>
+                            <a:rPr lang="en-US" baseline="0" dirty="0" smtClean="0"/>
+                            <a:t> </a:t>
+                          </a:r>
+                          <a:r>
+                            <a:rPr lang="ru-RU" baseline="0" dirty="0" smtClean="0"/>
+                            <a:t>в </a:t>
+                          </a:r>
+                          <a:r>
+                            <a:rPr lang="ru-RU" baseline="0" dirty="0"/>
+                            <a:t>случае </a:t>
                           </a:r>
                           <a:r>
                             <a:rPr lang="en-US" baseline="0" dirty="0"/>
@@ -8391,7 +8419,7 @@
               <p:nvPr>
                 <p:extLst>
                   <p:ext uri="{D42A27DB-BD31-4B8C-83A1-F6EECF244321}">
-                    <p14:modId xmlns:p14="http://schemas.microsoft.com/office/powerpoint/2010/main" val="320598462"/>
+                    <p14:modId xmlns:p14="http://schemas.microsoft.com/office/powerpoint/2010/main" val="2210108017"/>
                   </p:ext>
                 </p:extLst>
               </p:nvPr>
@@ -8428,7 +8456,7 @@
                         <a:blipFill>
                           <a:blip r:embed="rId3"/>
                           <a:stretch>
-                            <a:fillRect t="-8333" b="-1163889"/>
+                            <a:fillRect t="-10667" r="-100" b="-1162667"/>
                           </a:stretch>
                         </a:blipFill>
                       </a:tcPr>
@@ -8452,7 +8480,7 @@
                         <a:blipFill>
                           <a:blip r:embed="rId3"/>
                           <a:stretch>
-                            <a:fillRect t="-9308"/>
+                            <a:fillRect t="-9529" r="-100" b="-115"/>
                           </a:stretch>
                         </a:blipFill>
                       </a:tcPr>
@@ -10273,8 +10301,8 @@
           </a:graphicData>
         </a:graphic>
       </p:graphicFrame>
-      <mc:AlternateContent xmlns:mc="http://schemas.openxmlformats.org/markup-compatibility/2006">
-        <mc:Choice xmlns:a14="http://schemas.microsoft.com/office/drawing/2010/main" Requires="a14">
+      <mc:AlternateContent xmlns:mc="http://schemas.openxmlformats.org/markup-compatibility/2006" xmlns:a14="http://schemas.microsoft.com/office/drawing/2010/main">
+        <mc:Choice Requires="a14">
           <p:graphicFrame>
             <p:nvGraphicFramePr>
               <p:cNvPr id="2" name="Table 1"/>
@@ -10596,7 +10624,7 @@
             </a:graphic>
           </p:graphicFrame>
         </mc:Choice>
-        <mc:Fallback>
+        <mc:Fallback xmlns="">
           <p:graphicFrame>
             <p:nvGraphicFramePr>
               <p:cNvPr id="2" name="Table 1"/>
@@ -10871,8 +10899,8 @@
           </a:graphicData>
         </a:graphic>
       </p:graphicFrame>
-      <mc:AlternateContent xmlns:mc="http://schemas.openxmlformats.org/markup-compatibility/2006">
-        <mc:Choice xmlns:a14="http://schemas.microsoft.com/office/drawing/2010/main" Requires="a14">
+      <mc:AlternateContent xmlns:mc="http://schemas.openxmlformats.org/markup-compatibility/2006" xmlns:a14="http://schemas.microsoft.com/office/drawing/2010/main">
+        <mc:Choice Requires="a14">
           <p:graphicFrame>
             <p:nvGraphicFramePr>
               <p:cNvPr id="2" name="Table 1"/>
@@ -11239,9 +11267,17 @@
                             <a:rPr lang="ru-RU" baseline="0" dirty="0"/>
                             <a:t>.</a:t>
                           </a:r>
+                          <a:r>
+                            <a:rPr lang="en-US" baseline="0" dirty="0"/>
+                            <a:t/>
+                          </a:r>
                           <a:br>
                             <a:rPr lang="en-US" baseline="0" dirty="0"/>
                           </a:br>
+                          <a:r>
+                            <a:rPr lang="en-US" baseline="0" dirty="0"/>
+                            <a:t/>
+                          </a:r>
                           <a:br>
                             <a:rPr lang="en-US" baseline="0" dirty="0"/>
                           </a:br>
@@ -11451,7 +11487,7 @@
             </a:graphic>
           </p:graphicFrame>
         </mc:Choice>
-        <mc:Fallback>
+        <mc:Fallback xmlns="">
           <p:graphicFrame>
             <p:nvGraphicFramePr>
               <p:cNvPr id="2" name="Table 1"/>
@@ -12389,8 +12425,8 @@
           </a:graphicData>
         </a:graphic>
       </p:graphicFrame>
-      <mc:AlternateContent xmlns:mc="http://schemas.openxmlformats.org/markup-compatibility/2006">
-        <mc:Choice xmlns:a14="http://schemas.microsoft.com/office/drawing/2010/main" Requires="a14">
+      <mc:AlternateContent xmlns:mc="http://schemas.openxmlformats.org/markup-compatibility/2006" xmlns:a14="http://schemas.microsoft.com/office/drawing/2010/main">
+        <mc:Choice Requires="a14">
           <p:graphicFrame>
             <p:nvGraphicFramePr>
               <p:cNvPr id="2" name="Table 1"/>
@@ -13055,7 +13091,7 @@
             </a:graphic>
           </p:graphicFrame>
         </mc:Choice>
-        <mc:Fallback>
+        <mc:Fallback xmlns="">
           <p:graphicFrame>
             <p:nvGraphicFramePr>
               <p:cNvPr id="2" name="Table 1"/>
@@ -13301,7 +13337,7 @@
           <p:nvPr>
             <p:extLst>
               <p:ext uri="{D42A27DB-BD31-4B8C-83A1-F6EECF244321}">
-                <p14:modId xmlns:p14="http://schemas.microsoft.com/office/powerpoint/2010/main" val="2158494763"/>
+                <p14:modId xmlns:p14="http://schemas.microsoft.com/office/powerpoint/2010/main" val="2491647554"/>
               </p:ext>
             </p:extLst>
           </p:nvPr>
@@ -13332,8 +13368,8 @@
                     <a:lstStyle/>
                     <a:p>
                       <a:r>
-                        <a:rPr lang="en-US" dirty="0"/>
-                        <a:t>pivots</a:t>
+                        <a:rPr lang="en-US" dirty="0" smtClean="0"/>
+                        <a:t>commands</a:t>
                       </a:r>
                       <a:endParaRPr lang="ru-RU" dirty="0"/>
                     </a:p>
@@ -13353,8 +13389,8 @@
                     <a:lstStyle/>
                     <a:p>
                       <a:r>
-                        <a:rPr lang="en-US" dirty="0"/>
-                        <a:t>commands</a:t>
+                        <a:rPr lang="en-US" dirty="0" smtClean="0"/>
+                        <a:t>pivots</a:t>
                       </a:r>
                       <a:endParaRPr lang="ru-RU" dirty="0"/>
                     </a:p>
@@ -13386,7 +13422,7 @@
           <p:nvPr>
             <p:extLst>
               <p:ext uri="{D42A27DB-BD31-4B8C-83A1-F6EECF244321}">
-                <p14:modId xmlns:p14="http://schemas.microsoft.com/office/powerpoint/2010/main" val="2793791241"/>
+                <p14:modId xmlns:p14="http://schemas.microsoft.com/office/powerpoint/2010/main" val="2601823256"/>
               </p:ext>
             </p:extLst>
           </p:nvPr>
@@ -13417,8 +13453,8 @@
                     <a:lstStyle/>
                     <a:p>
                       <a:r>
-                        <a:rPr lang="en-US" dirty="0"/>
-                        <a:t>pivots</a:t>
+                        <a:rPr lang="en-US" dirty="0" smtClean="0"/>
+                        <a:t>commands</a:t>
                       </a:r>
                       <a:endParaRPr lang="ru-RU" dirty="0"/>
                     </a:p>
@@ -13438,8 +13474,8 @@
                     <a:lstStyle/>
                     <a:p>
                       <a:r>
-                        <a:rPr lang="en-US" dirty="0"/>
-                        <a:t>commands</a:t>
+                        <a:rPr lang="en-US" dirty="0" smtClean="0"/>
+                        <a:t>pivots</a:t>
                       </a:r>
                       <a:endParaRPr lang="ru-RU" dirty="0"/>
                     </a:p>
@@ -13471,7 +13507,7 @@
           <p:nvPr>
             <p:extLst>
               <p:ext uri="{D42A27DB-BD31-4B8C-83A1-F6EECF244321}">
-                <p14:modId xmlns:p14="http://schemas.microsoft.com/office/powerpoint/2010/main" val="3477404316"/>
+                <p14:modId xmlns:p14="http://schemas.microsoft.com/office/powerpoint/2010/main" val="1644189815"/>
               </p:ext>
             </p:extLst>
           </p:nvPr>
@@ -13502,8 +13538,8 @@
                     <a:lstStyle/>
                     <a:p>
                       <a:r>
-                        <a:rPr lang="en-US" dirty="0"/>
-                        <a:t>pivots</a:t>
+                        <a:rPr lang="en-US" dirty="0" smtClean="0"/>
+                        <a:t>commands</a:t>
                       </a:r>
                       <a:endParaRPr lang="ru-RU" dirty="0"/>
                     </a:p>
@@ -13523,8 +13559,8 @@
                     <a:lstStyle/>
                     <a:p>
                       <a:r>
-                        <a:rPr lang="en-US" dirty="0"/>
-                        <a:t>commands</a:t>
+                        <a:rPr lang="en-US" dirty="0" smtClean="0"/>
+                        <a:t>pivots</a:t>
                       </a:r>
                       <a:endParaRPr lang="ru-RU" dirty="0"/>
                     </a:p>
@@ -13556,7 +13592,7 @@
           <p:nvPr>
             <p:extLst>
               <p:ext uri="{D42A27DB-BD31-4B8C-83A1-F6EECF244321}">
-                <p14:modId xmlns:p14="http://schemas.microsoft.com/office/powerpoint/2010/main" val="1030714123"/>
+                <p14:modId xmlns:p14="http://schemas.microsoft.com/office/powerpoint/2010/main" val="2773729737"/>
               </p:ext>
             </p:extLst>
           </p:nvPr>
@@ -13587,8 +13623,8 @@
                     <a:lstStyle/>
                     <a:p>
                       <a:r>
-                        <a:rPr lang="en-US" dirty="0"/>
-                        <a:t>pivots</a:t>
+                        <a:rPr lang="en-US" dirty="0" smtClean="0"/>
+                        <a:t>commands</a:t>
                       </a:r>
                       <a:endParaRPr lang="ru-RU" dirty="0"/>
                     </a:p>
@@ -13608,8 +13644,8 @@
                     <a:lstStyle/>
                     <a:p>
                       <a:r>
-                        <a:rPr lang="en-US" dirty="0"/>
-                        <a:t>commands</a:t>
+                        <a:rPr lang="en-US" dirty="0" smtClean="0"/>
+                        <a:t>pivots</a:t>
                       </a:r>
                       <a:endParaRPr lang="ru-RU" dirty="0"/>
                     </a:p>
@@ -13677,7 +13713,7 @@
           <p:nvPr>
             <p:extLst>
               <p:ext uri="{D42A27DB-BD31-4B8C-83A1-F6EECF244321}">
-                <p14:modId xmlns:p14="http://schemas.microsoft.com/office/powerpoint/2010/main" val="2807557649"/>
+                <p14:modId xmlns:p14="http://schemas.microsoft.com/office/powerpoint/2010/main" val="3099387354"/>
               </p:ext>
             </p:extLst>
           </p:nvPr>
@@ -13708,8 +13744,8 @@
                     <a:lstStyle/>
                     <a:p>
                       <a:r>
-                        <a:rPr lang="en-US" dirty="0"/>
-                        <a:t>pivots</a:t>
+                        <a:rPr lang="en-US" dirty="0" smtClean="0"/>
+                        <a:t>elements</a:t>
                       </a:r>
                       <a:endParaRPr lang="ru-RU" dirty="0"/>
                     </a:p>
@@ -14123,6 +14159,13 @@
   <p:clrMapOvr>
     <a:masterClrMapping/>
   </p:clrMapOvr>
+  <p:timing>
+    <p:tnLst>
+      <p:par>
+        <p:cTn id="1" dur="indefinite" restart="never" nodeType="tmRoot"/>
+      </p:par>
+    </p:tnLst>
+  </p:timing>
 </p:sld>
 </file>
 
@@ -15086,13 +15129,7 @@
                         <a:rPr lang="en-US" baseline="0" dirty="0">
                           <a:hlinkClick r:id="rId3"/>
                         </a:rPr>
-                        <a:t>http://cseweb.ucsd.edu/~gmporter</a:t>
-                      </a:r>
-                      <a:r>
-                        <a:rPr lang="en-US" baseline="0">
-                          <a:hlinkClick r:id="rId3"/>
-                        </a:rPr>
-                        <a:t>/classes/fa17/cse124/post/schedule/p74-dean.pdf</a:t>
+                        <a:t>http://cseweb.ucsd.edu/~gmporter/classes/fa17/cse124/post/schedule/p74-dean.pdf</a:t>
                       </a:r>
                       <a:endParaRPr lang="en-US" baseline="0" dirty="0"/>
                     </a:p>
@@ -15741,8 +15778,8 @@
           </a:graphicData>
         </a:graphic>
       </p:graphicFrame>
-      <mc:AlternateContent xmlns:mc="http://schemas.openxmlformats.org/markup-compatibility/2006">
-        <mc:Choice xmlns:a14="http://schemas.microsoft.com/office/drawing/2010/main" Requires="a14">
+      <mc:AlternateContent xmlns:mc="http://schemas.openxmlformats.org/markup-compatibility/2006" xmlns:a14="http://schemas.microsoft.com/office/drawing/2010/main">
+        <mc:Choice Requires="a14">
           <p:graphicFrame>
             <p:nvGraphicFramePr>
               <p:cNvPr id="2" name="Table 1"/>
@@ -16299,7 +16336,7 @@
             </a:graphic>
           </p:graphicFrame>
         </mc:Choice>
-        <mc:Fallback>
+        <mc:Fallback xmlns="">
           <p:graphicFrame>
             <p:nvGraphicFramePr>
               <p:cNvPr id="2" name="Table 1"/>
@@ -16545,7 +16582,7 @@
           <p:nvPr>
             <p:extLst>
               <p:ext uri="{D42A27DB-BD31-4B8C-83A1-F6EECF244321}">
-                <p14:modId xmlns:p14="http://schemas.microsoft.com/office/powerpoint/2010/main" val="804662714"/>
+                <p14:modId xmlns:p14="http://schemas.microsoft.com/office/powerpoint/2010/main" val="1299955660"/>
               </p:ext>
             </p:extLst>
           </p:nvPr>
@@ -16583,47 +16620,6 @@
                   </a:extLst>
                 </a:gridCol>
               </a:tblGrid>
-              <a:tr h="370840">
-                <a:tc gridSpan="3">
-                  <a:txBody>
-                    <a:bodyPr/>
-                    <a:lstStyle/>
-                    <a:p>
-                      <a:r>
-                        <a:rPr lang="en-US" dirty="0"/>
-                        <a:t>pivots</a:t>
-                      </a:r>
-                      <a:endParaRPr lang="ru-RU" dirty="0"/>
-                    </a:p>
-                  </a:txBody>
-                  <a:tcPr/>
-                </a:tc>
-                <a:tc hMerge="1">
-                  <a:txBody>
-                    <a:bodyPr/>
-                    <a:lstStyle/>
-                    <a:p>
-                      <a:endParaRPr lang="ru-RU"/>
-                    </a:p>
-                  </a:txBody>
-                  <a:tcPr/>
-                </a:tc>
-                <a:tc hMerge="1">
-                  <a:txBody>
-                    <a:bodyPr/>
-                    <a:lstStyle/>
-                    <a:p>
-                      <a:endParaRPr lang="ru-RU"/>
-                    </a:p>
-                  </a:txBody>
-                  <a:tcPr/>
-                </a:tc>
-                <a:extLst>
-                  <a:ext uri="{0D108BD9-81ED-4DB2-BD59-A6C34878D82A}">
-                    <a16:rowId xmlns:a16="http://schemas.microsoft.com/office/drawing/2014/main" val="2904599238"/>
-                  </a:ext>
-                </a:extLst>
-              </a:tr>
               <a:tr h="370840">
                 <a:tc>
                   <a:txBody>
@@ -16669,6 +16665,53 @@
                   </a:ext>
                 </a:extLst>
               </a:tr>
+              <a:tr h="370840">
+                <a:tc gridSpan="3">
+                  <a:txBody>
+                    <a:bodyPr/>
+                    <a:lstStyle/>
+                    <a:p>
+                      <a:r>
+                        <a:rPr lang="en-US" dirty="0" smtClean="0"/>
+                        <a:t>pivots</a:t>
+                      </a:r>
+                      <a:endParaRPr lang="ru-RU" dirty="0"/>
+                    </a:p>
+                  </a:txBody>
+                  <a:tcPr>
+                    <a:noFill/>
+                  </a:tcPr>
+                </a:tc>
+                <a:tc hMerge="1">
+                  <a:txBody>
+                    <a:bodyPr/>
+                    <a:lstStyle/>
+                    <a:p>
+                      <a:endParaRPr lang="ru-RU" dirty="0"/>
+                    </a:p>
+                  </a:txBody>
+                  <a:tcPr>
+                    <a:solidFill>
+                      <a:srgbClr val="C00000"/>
+                    </a:solidFill>
+                  </a:tcPr>
+                </a:tc>
+                <a:tc hMerge="1">
+                  <a:txBody>
+                    <a:bodyPr/>
+                    <a:lstStyle/>
+                    <a:p>
+                      <a:endParaRPr lang="ru-RU" dirty="0"/>
+                    </a:p>
+                  </a:txBody>
+                  <a:tcPr/>
+                </a:tc>
+                <a:extLst>
+                  <a:ext uri="{0D108BD9-81ED-4DB2-BD59-A6C34878D82A}">
+                    <a16:rowId xmlns:a16="http://schemas.microsoft.com/office/drawing/2014/main" val="542067439"/>
+                  </a:ext>
+                </a:extLst>
+              </a:tr>
             </a:tbl>
           </a:graphicData>
         </a:graphic>
@@ -16685,7 +16728,13 @@
           <p:cNvGraphicFramePr>
             <a:graphicFrameLocks noGrp="1"/>
           </p:cNvGraphicFramePr>
-          <p:nvPr/>
+          <p:nvPr>
+            <p:extLst>
+              <p:ext uri="{D42A27DB-BD31-4B8C-83A1-F6EECF244321}">
+                <p14:modId xmlns:p14="http://schemas.microsoft.com/office/powerpoint/2010/main" val="3090734739"/>
+              </p:ext>
+            </p:extLst>
+          </p:nvPr>
         </p:nvGraphicFramePr>
         <p:xfrm>
           <a:off x="246743" y="1993294"/>
@@ -16713,8 +16762,8 @@
                     <a:lstStyle/>
                     <a:p>
                       <a:r>
-                        <a:rPr lang="en-US" dirty="0"/>
-                        <a:t>pivots</a:t>
+                        <a:rPr lang="en-US" dirty="0" smtClean="0"/>
+                        <a:t>commands</a:t>
                       </a:r>
                       <a:endParaRPr lang="ru-RU" dirty="0"/>
                     </a:p>
@@ -16734,8 +16783,8 @@
                     <a:lstStyle/>
                     <a:p>
                       <a:r>
-                        <a:rPr lang="en-US" dirty="0"/>
-                        <a:t>commands</a:t>
+                        <a:rPr lang="en-US" dirty="0" smtClean="0"/>
+                        <a:t>pivots</a:t>
                       </a:r>
                       <a:endParaRPr lang="ru-RU" dirty="0"/>
                     </a:p>
@@ -16764,7 +16813,13 @@
           <p:cNvGraphicFramePr>
             <a:graphicFrameLocks noGrp="1"/>
           </p:cNvGraphicFramePr>
-          <p:nvPr/>
+          <p:nvPr>
+            <p:extLst>
+              <p:ext uri="{D42A27DB-BD31-4B8C-83A1-F6EECF244321}">
+                <p14:modId xmlns:p14="http://schemas.microsoft.com/office/powerpoint/2010/main" val="1489872292"/>
+              </p:ext>
+            </p:extLst>
+          </p:nvPr>
         </p:nvGraphicFramePr>
         <p:xfrm>
           <a:off x="1672772" y="1977535"/>
@@ -16792,8 +16847,8 @@
                     <a:lstStyle/>
                     <a:p>
                       <a:r>
-                        <a:rPr lang="en-US" dirty="0"/>
-                        <a:t>pivots</a:t>
+                        <a:rPr lang="en-US" dirty="0" smtClean="0"/>
+                        <a:t>commands</a:t>
                       </a:r>
                       <a:endParaRPr lang="ru-RU" dirty="0"/>
                     </a:p>
@@ -16813,8 +16868,8 @@
                     <a:lstStyle/>
                     <a:p>
                       <a:r>
-                        <a:rPr lang="en-US" dirty="0"/>
-                        <a:t>commands</a:t>
+                        <a:rPr lang="en-US" dirty="0" smtClean="0"/>
+                        <a:t>pivots</a:t>
                       </a:r>
                       <a:endParaRPr lang="ru-RU" dirty="0"/>
                     </a:p>
@@ -16843,7 +16898,13 @@
           <p:cNvGraphicFramePr>
             <a:graphicFrameLocks noGrp="1"/>
           </p:cNvGraphicFramePr>
-          <p:nvPr/>
+          <p:nvPr>
+            <p:extLst>
+              <p:ext uri="{D42A27DB-BD31-4B8C-83A1-F6EECF244321}">
+                <p14:modId xmlns:p14="http://schemas.microsoft.com/office/powerpoint/2010/main" val="1160645710"/>
+              </p:ext>
+            </p:extLst>
+          </p:nvPr>
         </p:nvGraphicFramePr>
         <p:xfrm>
           <a:off x="3621314" y="1955763"/>
@@ -16871,8 +16932,8 @@
                     <a:lstStyle/>
                     <a:p>
                       <a:r>
-                        <a:rPr lang="en-US" dirty="0"/>
-                        <a:t>pivots</a:t>
+                        <a:rPr lang="en-US" dirty="0" smtClean="0"/>
+                        <a:t>commands</a:t>
                       </a:r>
                       <a:endParaRPr lang="ru-RU" dirty="0"/>
                     </a:p>
@@ -16892,8 +16953,8 @@
                     <a:lstStyle/>
                     <a:p>
                       <a:r>
-                        <a:rPr lang="en-US" dirty="0"/>
-                        <a:t>commands</a:t>
+                        <a:rPr lang="en-US" dirty="0" smtClean="0"/>
+                        <a:t>pivots</a:t>
                       </a:r>
                       <a:endParaRPr lang="ru-RU" dirty="0"/>
                     </a:p>
@@ -16958,7 +17019,13 @@
           <p:cNvGraphicFramePr>
             <a:graphicFrameLocks noGrp="1"/>
           </p:cNvGraphicFramePr>
-          <p:nvPr/>
+          <p:nvPr>
+            <p:extLst>
+              <p:ext uri="{D42A27DB-BD31-4B8C-83A1-F6EECF244321}">
+                <p14:modId xmlns:p14="http://schemas.microsoft.com/office/powerpoint/2010/main" val="712564147"/>
+              </p:ext>
+            </p:extLst>
+          </p:nvPr>
         </p:nvGraphicFramePr>
         <p:xfrm>
           <a:off x="246743" y="3425578"/>
@@ -16986,8 +17053,8 @@
                     <a:lstStyle/>
                     <a:p>
                       <a:r>
-                        <a:rPr lang="en-US" dirty="0"/>
-                        <a:t>pivots</a:t>
+                        <a:rPr lang="en-US" dirty="0" smtClean="0"/>
+                        <a:t>elements</a:t>
                       </a:r>
                       <a:endParaRPr lang="ru-RU" dirty="0"/>
                     </a:p>
@@ -17536,8 +17603,8 @@
           </a:graphicData>
         </a:graphic>
       </p:graphicFrame>
-      <mc:AlternateContent xmlns:mc="http://schemas.openxmlformats.org/markup-compatibility/2006">
-        <mc:Choice xmlns:a14="http://schemas.microsoft.com/office/drawing/2010/main" Requires="a14">
+      <mc:AlternateContent xmlns:mc="http://schemas.openxmlformats.org/markup-compatibility/2006" xmlns:a14="http://schemas.microsoft.com/office/drawing/2010/main">
+        <mc:Choice Requires="a14">
           <p:graphicFrame>
             <p:nvGraphicFramePr>
               <p:cNvPr id="2" name="Table 1"/>
@@ -17982,7 +18049,7 @@
             </a:graphic>
           </p:graphicFrame>
         </mc:Choice>
-        <mc:Fallback>
+        <mc:Fallback xmlns="">
           <p:graphicFrame>
             <p:nvGraphicFramePr>
               <p:cNvPr id="2" name="Table 1"/>
@@ -18215,7 +18282,7 @@
       </mc:AlternateContent>
       <p:graphicFrame>
         <p:nvGraphicFramePr>
-          <p:cNvPr id="4" name="Table 3">
+          <p:cNvPr id="20" name="Table 19">
             <a:extLst>
               <a:ext uri="{FF2B5EF4-FFF2-40B4-BE49-F238E27FC236}">
                 <a16:creationId xmlns:a16="http://schemas.microsoft.com/office/drawing/2014/main" id="{540BC5F5-3CBB-3C43-ACE9-142DD19D098F}"/>
@@ -18228,7 +18295,7 @@
           <p:nvPr>
             <p:extLst>
               <p:ext uri="{D42A27DB-BD31-4B8C-83A1-F6EECF244321}">
-                <p14:modId xmlns:p14="http://schemas.microsoft.com/office/powerpoint/2010/main" val="3113206641"/>
+                <p14:modId xmlns:p14="http://schemas.microsoft.com/office/powerpoint/2010/main" val="3437429520"/>
               </p:ext>
             </p:extLst>
           </p:nvPr>
@@ -18267,47 +18334,6 @@
                 </a:gridCol>
               </a:tblGrid>
               <a:tr h="370840">
-                <a:tc gridSpan="3">
-                  <a:txBody>
-                    <a:bodyPr/>
-                    <a:lstStyle/>
-                    <a:p>
-                      <a:r>
-                        <a:rPr lang="en-US" dirty="0"/>
-                        <a:t>pivots</a:t>
-                      </a:r>
-                      <a:endParaRPr lang="ru-RU" dirty="0"/>
-                    </a:p>
-                  </a:txBody>
-                  <a:tcPr/>
-                </a:tc>
-                <a:tc hMerge="1">
-                  <a:txBody>
-                    <a:bodyPr/>
-                    <a:lstStyle/>
-                    <a:p>
-                      <a:endParaRPr lang="ru-RU"/>
-                    </a:p>
-                  </a:txBody>
-                  <a:tcPr/>
-                </a:tc>
-                <a:tc hMerge="1">
-                  <a:txBody>
-                    <a:bodyPr/>
-                    <a:lstStyle/>
-                    <a:p>
-                      <a:endParaRPr lang="ru-RU"/>
-                    </a:p>
-                  </a:txBody>
-                  <a:tcPr/>
-                </a:tc>
-                <a:extLst>
-                  <a:ext uri="{0D108BD9-81ED-4DB2-BD59-A6C34878D82A}">
-                    <a16:rowId xmlns:a16="http://schemas.microsoft.com/office/drawing/2014/main" val="2904599238"/>
-                  </a:ext>
-                </a:extLst>
-              </a:tr>
-              <a:tr h="370840">
                 <a:tc>
                   <a:txBody>
                     <a:bodyPr/>
@@ -18332,7 +18358,7 @@
                   </a:txBody>
                   <a:tcPr>
                     <a:solidFill>
-                      <a:srgbClr val="FF0000"/>
+                      <a:srgbClr val="C00000"/>
                     </a:solidFill>
                   </a:tcPr>
                 </a:tc>
@@ -18352,13 +18378,60 @@
                   </a:ext>
                 </a:extLst>
               </a:tr>
+              <a:tr h="370840">
+                <a:tc gridSpan="3">
+                  <a:txBody>
+                    <a:bodyPr/>
+                    <a:lstStyle/>
+                    <a:p>
+                      <a:r>
+                        <a:rPr lang="en-US" dirty="0" smtClean="0"/>
+                        <a:t>pivots</a:t>
+                      </a:r>
+                      <a:endParaRPr lang="ru-RU" dirty="0"/>
+                    </a:p>
+                  </a:txBody>
+                  <a:tcPr>
+                    <a:noFill/>
+                  </a:tcPr>
+                </a:tc>
+                <a:tc hMerge="1">
+                  <a:txBody>
+                    <a:bodyPr/>
+                    <a:lstStyle/>
+                    <a:p>
+                      <a:endParaRPr lang="ru-RU" dirty="0"/>
+                    </a:p>
+                  </a:txBody>
+                  <a:tcPr>
+                    <a:solidFill>
+                      <a:srgbClr val="C00000"/>
+                    </a:solidFill>
+                  </a:tcPr>
+                </a:tc>
+                <a:tc hMerge="1">
+                  <a:txBody>
+                    <a:bodyPr/>
+                    <a:lstStyle/>
+                    <a:p>
+                      <a:endParaRPr lang="ru-RU" dirty="0"/>
+                    </a:p>
+                  </a:txBody>
+                  <a:tcPr/>
+                </a:tc>
+                <a:extLst>
+                  <a:ext uri="{0D108BD9-81ED-4DB2-BD59-A6C34878D82A}">
+                    <a16:rowId xmlns:a16="http://schemas.microsoft.com/office/drawing/2014/main" val="542067439"/>
+                  </a:ext>
+                </a:extLst>
+              </a:tr>
             </a:tbl>
           </a:graphicData>
         </a:graphic>
       </p:graphicFrame>
       <p:graphicFrame>
         <p:nvGraphicFramePr>
-          <p:cNvPr id="7" name="Table 6">
+          <p:cNvPr id="22" name="Table 21">
             <a:extLst>
               <a:ext uri="{FF2B5EF4-FFF2-40B4-BE49-F238E27FC236}">
                 <a16:creationId xmlns:a16="http://schemas.microsoft.com/office/drawing/2014/main" id="{2A4B87A2-6BF6-334D-B575-78F25403D403}"/>
@@ -18368,7 +18441,13 @@
           <p:cNvGraphicFramePr>
             <a:graphicFrameLocks noGrp="1"/>
           </p:cNvGraphicFramePr>
-          <p:nvPr/>
+          <p:nvPr>
+            <p:extLst>
+              <p:ext uri="{D42A27DB-BD31-4B8C-83A1-F6EECF244321}">
+                <p14:modId xmlns:p14="http://schemas.microsoft.com/office/powerpoint/2010/main" val="3244199746"/>
+              </p:ext>
+            </p:extLst>
+          </p:nvPr>
         </p:nvGraphicFramePr>
         <p:xfrm>
           <a:off x="246743" y="1993294"/>
@@ -18396,8 +18475,8 @@
                     <a:lstStyle/>
                     <a:p>
                       <a:r>
-                        <a:rPr lang="en-US" dirty="0"/>
-                        <a:t>pivots</a:t>
+                        <a:rPr lang="en-US" dirty="0" smtClean="0"/>
+                        <a:t>commands</a:t>
                       </a:r>
                       <a:endParaRPr lang="ru-RU" dirty="0"/>
                     </a:p>
@@ -18417,8 +18496,8 @@
                     <a:lstStyle/>
                     <a:p>
                       <a:r>
-                        <a:rPr lang="en-US" dirty="0"/>
-                        <a:t>commands</a:t>
+                        <a:rPr lang="en-US" dirty="0" smtClean="0"/>
+                        <a:t>pivots</a:t>
                       </a:r>
                       <a:endParaRPr lang="ru-RU" dirty="0"/>
                     </a:p>
@@ -18437,7 +18516,7 @@
       </p:graphicFrame>
       <p:graphicFrame>
         <p:nvGraphicFramePr>
-          <p:cNvPr id="8" name="Table 7">
+          <p:cNvPr id="23" name="Table 22">
             <a:extLst>
               <a:ext uri="{FF2B5EF4-FFF2-40B4-BE49-F238E27FC236}">
                 <a16:creationId xmlns:a16="http://schemas.microsoft.com/office/drawing/2014/main" id="{4477A714-9D80-3B43-A7C9-3FA93857301E}"/>
@@ -18447,7 +18526,13 @@
           <p:cNvGraphicFramePr>
             <a:graphicFrameLocks noGrp="1"/>
           </p:cNvGraphicFramePr>
-          <p:nvPr/>
+          <p:nvPr>
+            <p:extLst>
+              <p:ext uri="{D42A27DB-BD31-4B8C-83A1-F6EECF244321}">
+                <p14:modId xmlns:p14="http://schemas.microsoft.com/office/powerpoint/2010/main" val="3165867744"/>
+              </p:ext>
+            </p:extLst>
+          </p:nvPr>
         </p:nvGraphicFramePr>
         <p:xfrm>
           <a:off x="1672772" y="1977535"/>
@@ -18475,8 +18560,8 @@
                     <a:lstStyle/>
                     <a:p>
                       <a:r>
-                        <a:rPr lang="en-US" dirty="0"/>
-                        <a:t>pivots</a:t>
+                        <a:rPr lang="en-US" dirty="0" smtClean="0"/>
+                        <a:t>commands</a:t>
                       </a:r>
                       <a:endParaRPr lang="ru-RU" dirty="0"/>
                     </a:p>
@@ -18496,8 +18581,8 @@
                     <a:lstStyle/>
                     <a:p>
                       <a:r>
-                        <a:rPr lang="en-US" dirty="0"/>
-                        <a:t>commands</a:t>
+                        <a:rPr lang="en-US" dirty="0" smtClean="0"/>
+                        <a:t>pivots</a:t>
                       </a:r>
                       <a:endParaRPr lang="ru-RU" dirty="0"/>
                     </a:p>
@@ -18516,7 +18601,7 @@
       </p:graphicFrame>
       <p:graphicFrame>
         <p:nvGraphicFramePr>
-          <p:cNvPr id="9" name="Table 8">
+          <p:cNvPr id="25" name="Table 24">
             <a:extLst>
               <a:ext uri="{FF2B5EF4-FFF2-40B4-BE49-F238E27FC236}">
                 <a16:creationId xmlns:a16="http://schemas.microsoft.com/office/drawing/2014/main" id="{56616A28-EA0B-5040-9804-9D852BF9C7F7}"/>
@@ -18526,7 +18611,13 @@
           <p:cNvGraphicFramePr>
             <a:graphicFrameLocks noGrp="1"/>
           </p:cNvGraphicFramePr>
-          <p:nvPr/>
+          <p:nvPr>
+            <p:extLst>
+              <p:ext uri="{D42A27DB-BD31-4B8C-83A1-F6EECF244321}">
+                <p14:modId xmlns:p14="http://schemas.microsoft.com/office/powerpoint/2010/main" val="981873522"/>
+              </p:ext>
+            </p:extLst>
+          </p:nvPr>
         </p:nvGraphicFramePr>
         <p:xfrm>
           <a:off x="3621314" y="1955763"/>
@@ -18554,8 +18645,8 @@
                     <a:lstStyle/>
                     <a:p>
                       <a:r>
-                        <a:rPr lang="en-US" dirty="0"/>
-                        <a:t>pivots</a:t>
+                        <a:rPr lang="en-US" dirty="0" smtClean="0"/>
+                        <a:t>commands</a:t>
                       </a:r>
                       <a:endParaRPr lang="ru-RU" dirty="0"/>
                     </a:p>
@@ -18575,8 +18666,8 @@
                     <a:lstStyle/>
                     <a:p>
                       <a:r>
-                        <a:rPr lang="en-US" dirty="0"/>
-                        <a:t>commands</a:t>
+                        <a:rPr lang="en-US" dirty="0" smtClean="0"/>
+                        <a:t>pivots</a:t>
                       </a:r>
                       <a:endParaRPr lang="ru-RU" dirty="0"/>
                     </a:p>
@@ -18595,7 +18686,7 @@
       </p:graphicFrame>
       <p:sp>
         <p:nvSpPr>
-          <p:cNvPr id="10" name="TextBox 9">
+          <p:cNvPr id="27" name="TextBox 26">
             <a:extLst>
               <a:ext uri="{FF2B5EF4-FFF2-40B4-BE49-F238E27FC236}">
                 <a16:creationId xmlns:a16="http://schemas.microsoft.com/office/drawing/2014/main" id="{38574764-423C-3D4F-ADFF-3EB0A75A1936}"/>
@@ -18631,7 +18722,7 @@
       </p:sp>
       <p:graphicFrame>
         <p:nvGraphicFramePr>
-          <p:cNvPr id="11" name="Table 10">
+          <p:cNvPr id="29" name="Table 28">
             <a:extLst>
               <a:ext uri="{FF2B5EF4-FFF2-40B4-BE49-F238E27FC236}">
                 <a16:creationId xmlns:a16="http://schemas.microsoft.com/office/drawing/2014/main" id="{88538589-9133-BF42-A664-05590C14C1D1}"/>
@@ -18641,7 +18732,13 @@
           <p:cNvGraphicFramePr>
             <a:graphicFrameLocks noGrp="1"/>
           </p:cNvGraphicFramePr>
-          <p:nvPr/>
+          <p:nvPr>
+            <p:extLst>
+              <p:ext uri="{D42A27DB-BD31-4B8C-83A1-F6EECF244321}">
+                <p14:modId xmlns:p14="http://schemas.microsoft.com/office/powerpoint/2010/main" val="1481492408"/>
+              </p:ext>
+            </p:extLst>
+          </p:nvPr>
         </p:nvGraphicFramePr>
         <p:xfrm>
           <a:off x="246743" y="3425578"/>
@@ -18669,8 +18766,8 @@
                     <a:lstStyle/>
                     <a:p>
                       <a:r>
-                        <a:rPr lang="en-US" dirty="0"/>
-                        <a:t>pivots</a:t>
+                        <a:rPr lang="en-US" dirty="0" smtClean="0"/>
+                        <a:t>elements</a:t>
                       </a:r>
                       <a:endParaRPr lang="ru-RU" dirty="0"/>
                     </a:p>
@@ -18689,7 +18786,7 @@
       </p:graphicFrame>
       <p:cxnSp>
         <p:nvCxnSpPr>
-          <p:cNvPr id="13" name="Straight Arrow Connector 12">
+          <p:cNvPr id="30" name="Straight Arrow Connector 29">
             <a:extLst>
               <a:ext uri="{FF2B5EF4-FFF2-40B4-BE49-F238E27FC236}">
                 <a16:creationId xmlns:a16="http://schemas.microsoft.com/office/drawing/2014/main" id="{A7876C95-A1ED-FD46-89C3-471D0885A468}"/>
@@ -18697,7 +18794,7 @@
             </a:extLst>
           </p:cNvPr>
           <p:cNvCxnSpPr>
-            <a:endCxn id="7" idx="0"/>
+            <a:endCxn id="22" idx="0"/>
           </p:cNvCxnSpPr>
           <p:nvPr/>
         </p:nvCxnSpPr>
@@ -18733,7 +18830,7 @@
       </p:cxnSp>
       <p:cxnSp>
         <p:nvCxnSpPr>
-          <p:cNvPr id="15" name="Straight Arrow Connector 14">
+          <p:cNvPr id="31" name="Straight Arrow Connector 30">
             <a:extLst>
               <a:ext uri="{FF2B5EF4-FFF2-40B4-BE49-F238E27FC236}">
                 <a16:creationId xmlns:a16="http://schemas.microsoft.com/office/drawing/2014/main" id="{8CAF3A44-9089-C54B-9ED7-27E17CF0AA32}"/>
@@ -18741,7 +18838,7 @@
             </a:extLst>
           </p:cNvPr>
           <p:cNvCxnSpPr>
-            <a:endCxn id="8" idx="0"/>
+            <a:endCxn id="23" idx="0"/>
           </p:cNvCxnSpPr>
           <p:nvPr/>
         </p:nvCxnSpPr>
@@ -18777,7 +18874,7 @@
       </p:cxnSp>
       <p:cxnSp>
         <p:nvCxnSpPr>
-          <p:cNvPr id="17" name="Straight Arrow Connector 16">
+          <p:cNvPr id="33" name="Straight Arrow Connector 32">
             <a:extLst>
               <a:ext uri="{FF2B5EF4-FFF2-40B4-BE49-F238E27FC236}">
                 <a16:creationId xmlns:a16="http://schemas.microsoft.com/office/drawing/2014/main" id="{A3DCF2CF-9BD5-E24F-9347-6F929858C999}"/>
@@ -18819,7 +18916,7 @@
       </p:cxnSp>
       <p:cxnSp>
         <p:nvCxnSpPr>
-          <p:cNvPr id="19" name="Straight Arrow Connector 18">
+          <p:cNvPr id="34" name="Straight Arrow Connector 33">
             <a:extLst>
               <a:ext uri="{FF2B5EF4-FFF2-40B4-BE49-F238E27FC236}">
                 <a16:creationId xmlns:a16="http://schemas.microsoft.com/office/drawing/2014/main" id="{8B50A883-5FE5-5140-9869-F8E784436BEE}"/>
@@ -18861,7 +18958,7 @@
       </p:cxnSp>
       <p:cxnSp>
         <p:nvCxnSpPr>
-          <p:cNvPr id="21" name="Straight Arrow Connector 20">
+          <p:cNvPr id="35" name="Straight Arrow Connector 34">
             <a:extLst>
               <a:ext uri="{FF2B5EF4-FFF2-40B4-BE49-F238E27FC236}">
                 <a16:creationId xmlns:a16="http://schemas.microsoft.com/office/drawing/2014/main" id="{7E4633B1-D72D-9743-A4D8-5E3695848B42}"/>
@@ -18870,7 +18967,7 @@
           </p:cNvPr>
           <p:cNvCxnSpPr>
             <a:cxnSpLocks/>
-            <a:endCxn id="9" idx="0"/>
+            <a:endCxn id="25" idx="0"/>
           </p:cNvCxnSpPr>
           <p:nvPr/>
         </p:nvCxnSpPr>
@@ -18906,7 +19003,7 @@
       </p:cxnSp>
       <p:cxnSp>
         <p:nvCxnSpPr>
-          <p:cNvPr id="24" name="Straight Arrow Connector 23">
+          <p:cNvPr id="36" name="Straight Arrow Connector 35">
             <a:extLst>
               <a:ext uri="{FF2B5EF4-FFF2-40B4-BE49-F238E27FC236}">
                 <a16:creationId xmlns:a16="http://schemas.microsoft.com/office/drawing/2014/main" id="{76827C7F-CD48-0943-8AEE-57210ACBD309}"/>
@@ -18915,8 +19012,8 @@
           </p:cNvPr>
           <p:cNvCxnSpPr>
             <a:cxnSpLocks/>
-            <a:stCxn id="7" idx="2"/>
-            <a:endCxn id="11" idx="0"/>
+            <a:stCxn id="22" idx="2"/>
+            <a:endCxn id="29" idx="0"/>
           </p:cNvCxnSpPr>
           <p:nvPr/>
         </p:nvCxnSpPr>
@@ -18952,7 +19049,7 @@
       </p:cxnSp>
       <p:cxnSp>
         <p:nvCxnSpPr>
-          <p:cNvPr id="26" name="Straight Arrow Connector 25">
+          <p:cNvPr id="37" name="Straight Arrow Connector 36">
             <a:extLst>
               <a:ext uri="{FF2B5EF4-FFF2-40B4-BE49-F238E27FC236}">
                 <a16:creationId xmlns:a16="http://schemas.microsoft.com/office/drawing/2014/main" id="{174232A4-8AD0-1746-BBF8-7B95F2C11B55}"/>
@@ -18996,7 +19093,7 @@
       </p:cxnSp>
       <p:cxnSp>
         <p:nvCxnSpPr>
-          <p:cNvPr id="28" name="Straight Arrow Connector 27">
+          <p:cNvPr id="38" name="Straight Arrow Connector 37">
             <a:extLst>
               <a:ext uri="{FF2B5EF4-FFF2-40B4-BE49-F238E27FC236}">
                 <a16:creationId xmlns:a16="http://schemas.microsoft.com/office/drawing/2014/main" id="{CBBE74FE-7A86-BB4C-AB69-0E3D761C5FA5}"/>
@@ -19040,7 +19137,7 @@
       </p:cxnSp>
       <p:sp>
         <p:nvSpPr>
-          <p:cNvPr id="32" name="TextBox 31">
+          <p:cNvPr id="39" name="TextBox 38">
             <a:extLst>
               <a:ext uri="{FF2B5EF4-FFF2-40B4-BE49-F238E27FC236}">
                 <a16:creationId xmlns:a16="http://schemas.microsoft.com/office/drawing/2014/main" id="{602F302C-5C3C-CA40-9EE6-2D6DAC43FC4E}"/>
@@ -19219,8 +19316,8 @@
           </a:graphicData>
         </a:graphic>
       </p:graphicFrame>
-      <mc:AlternateContent xmlns:mc="http://schemas.openxmlformats.org/markup-compatibility/2006">
-        <mc:Choice xmlns:a14="http://schemas.microsoft.com/office/drawing/2010/main" Requires="a14">
+      <mc:AlternateContent xmlns:mc="http://schemas.openxmlformats.org/markup-compatibility/2006" xmlns:a14="http://schemas.microsoft.com/office/drawing/2010/main">
+        <mc:Choice Requires="a14">
           <p:graphicFrame>
             <p:nvGraphicFramePr>
               <p:cNvPr id="2" name="Table 1"/>
@@ -19614,7 +19711,7 @@
             </a:graphic>
           </p:graphicFrame>
         </mc:Choice>
-        <mc:Fallback>
+        <mc:Fallback xmlns="">
           <p:graphicFrame>
             <p:nvGraphicFramePr>
               <p:cNvPr id="2" name="Table 1"/>
@@ -19847,7 +19944,7 @@
       </mc:AlternateContent>
       <p:graphicFrame>
         <p:nvGraphicFramePr>
-          <p:cNvPr id="4" name="Table 3">
+          <p:cNvPr id="55" name="Table 54">
             <a:extLst>
               <a:ext uri="{FF2B5EF4-FFF2-40B4-BE49-F238E27FC236}">
                 <a16:creationId xmlns:a16="http://schemas.microsoft.com/office/drawing/2014/main" id="{540BC5F5-3CBB-3C43-ACE9-142DD19D098F}"/>
@@ -19857,7 +19954,13 @@
           <p:cNvGraphicFramePr>
             <a:graphicFrameLocks noGrp="1"/>
           </p:cNvGraphicFramePr>
-          <p:nvPr/>
+          <p:nvPr>
+            <p:extLst>
+              <p:ext uri="{D42A27DB-BD31-4B8C-83A1-F6EECF244321}">
+                <p14:modId xmlns:p14="http://schemas.microsoft.com/office/powerpoint/2010/main" val="3437429520"/>
+              </p:ext>
+            </p:extLst>
+          </p:nvPr>
         </p:nvGraphicFramePr>
         <p:xfrm>
           <a:off x="1672772" y="915609"/>
@@ -19893,47 +19996,6 @@
                 </a:gridCol>
               </a:tblGrid>
               <a:tr h="370840">
-                <a:tc gridSpan="3">
-                  <a:txBody>
-                    <a:bodyPr/>
-                    <a:lstStyle/>
-                    <a:p>
-                      <a:r>
-                        <a:rPr lang="en-US" dirty="0"/>
-                        <a:t>pivots</a:t>
-                      </a:r>
-                      <a:endParaRPr lang="ru-RU" dirty="0"/>
-                    </a:p>
-                  </a:txBody>
-                  <a:tcPr/>
-                </a:tc>
-                <a:tc hMerge="1">
-                  <a:txBody>
-                    <a:bodyPr/>
-                    <a:lstStyle/>
-                    <a:p>
-                      <a:endParaRPr lang="ru-RU"/>
-                    </a:p>
-                  </a:txBody>
-                  <a:tcPr/>
-                </a:tc>
-                <a:tc hMerge="1">
-                  <a:txBody>
-                    <a:bodyPr/>
-                    <a:lstStyle/>
-                    <a:p>
-                      <a:endParaRPr lang="ru-RU"/>
-                    </a:p>
-                  </a:txBody>
-                  <a:tcPr/>
-                </a:tc>
-                <a:extLst>
-                  <a:ext uri="{0D108BD9-81ED-4DB2-BD59-A6C34878D82A}">
-                    <a16:rowId xmlns:a16="http://schemas.microsoft.com/office/drawing/2014/main" val="2904599238"/>
-                  </a:ext>
-                </a:extLst>
-              </a:tr>
-              <a:tr h="370840">
                 <a:tc>
                   <a:txBody>
                     <a:bodyPr/>
@@ -19958,7 +20020,7 @@
                   </a:txBody>
                   <a:tcPr>
                     <a:solidFill>
-                      <a:srgbClr val="FF0000"/>
+                      <a:srgbClr val="C00000"/>
                     </a:solidFill>
                   </a:tcPr>
                 </a:tc>
@@ -19978,13 +20040,60 @@
                   </a:ext>
                 </a:extLst>
               </a:tr>
+              <a:tr h="370840">
+                <a:tc gridSpan="3">
+                  <a:txBody>
+                    <a:bodyPr/>
+                    <a:lstStyle/>
+                    <a:p>
+                      <a:r>
+                        <a:rPr lang="en-US" dirty="0" smtClean="0"/>
+                        <a:t>pivots</a:t>
+                      </a:r>
+                      <a:endParaRPr lang="ru-RU" dirty="0"/>
+                    </a:p>
+                  </a:txBody>
+                  <a:tcPr>
+                    <a:noFill/>
+                  </a:tcPr>
+                </a:tc>
+                <a:tc hMerge="1">
+                  <a:txBody>
+                    <a:bodyPr/>
+                    <a:lstStyle/>
+                    <a:p>
+                      <a:endParaRPr lang="ru-RU" dirty="0"/>
+                    </a:p>
+                  </a:txBody>
+                  <a:tcPr>
+                    <a:solidFill>
+                      <a:srgbClr val="C00000"/>
+                    </a:solidFill>
+                  </a:tcPr>
+                </a:tc>
+                <a:tc hMerge="1">
+                  <a:txBody>
+                    <a:bodyPr/>
+                    <a:lstStyle/>
+                    <a:p>
+                      <a:endParaRPr lang="ru-RU" dirty="0"/>
+                    </a:p>
+                  </a:txBody>
+                  <a:tcPr/>
+                </a:tc>
+                <a:extLst>
+                  <a:ext uri="{0D108BD9-81ED-4DB2-BD59-A6C34878D82A}">
+                    <a16:rowId xmlns:a16="http://schemas.microsoft.com/office/drawing/2014/main" val="542067439"/>
+                  </a:ext>
+                </a:extLst>
+              </a:tr>
             </a:tbl>
           </a:graphicData>
         </a:graphic>
       </p:graphicFrame>
       <p:graphicFrame>
         <p:nvGraphicFramePr>
-          <p:cNvPr id="7" name="Table 6">
+          <p:cNvPr id="56" name="Table 55">
             <a:extLst>
               <a:ext uri="{FF2B5EF4-FFF2-40B4-BE49-F238E27FC236}">
                 <a16:creationId xmlns:a16="http://schemas.microsoft.com/office/drawing/2014/main" id="{2A4B87A2-6BF6-334D-B575-78F25403D403}"/>
@@ -19994,7 +20103,13 @@
           <p:cNvGraphicFramePr>
             <a:graphicFrameLocks noGrp="1"/>
           </p:cNvGraphicFramePr>
-          <p:nvPr/>
+          <p:nvPr>
+            <p:extLst>
+              <p:ext uri="{D42A27DB-BD31-4B8C-83A1-F6EECF244321}">
+                <p14:modId xmlns:p14="http://schemas.microsoft.com/office/powerpoint/2010/main" val="3244199746"/>
+              </p:ext>
+            </p:extLst>
+          </p:nvPr>
         </p:nvGraphicFramePr>
         <p:xfrm>
           <a:off x="246743" y="1993294"/>
@@ -20022,8 +20137,8 @@
                     <a:lstStyle/>
                     <a:p>
                       <a:r>
-                        <a:rPr lang="en-US" dirty="0"/>
-                        <a:t>pivots</a:t>
+                        <a:rPr lang="en-US" dirty="0" smtClean="0"/>
+                        <a:t>commands</a:t>
                       </a:r>
                       <a:endParaRPr lang="ru-RU" dirty="0"/>
                     </a:p>
@@ -20043,8 +20158,8 @@
                     <a:lstStyle/>
                     <a:p>
                       <a:r>
-                        <a:rPr lang="en-US" dirty="0"/>
-                        <a:t>commands</a:t>
+                        <a:rPr lang="en-US" dirty="0" smtClean="0"/>
+                        <a:t>pivots</a:t>
                       </a:r>
                       <a:endParaRPr lang="ru-RU" dirty="0"/>
                     </a:p>
@@ -20063,7 +20178,7 @@
       </p:graphicFrame>
       <p:graphicFrame>
         <p:nvGraphicFramePr>
-          <p:cNvPr id="8" name="Table 7">
+          <p:cNvPr id="57" name="Table 56">
             <a:extLst>
               <a:ext uri="{FF2B5EF4-FFF2-40B4-BE49-F238E27FC236}">
                 <a16:creationId xmlns:a16="http://schemas.microsoft.com/office/drawing/2014/main" id="{4477A714-9D80-3B43-A7C9-3FA93857301E}"/>
@@ -20073,7 +20188,13 @@
           <p:cNvGraphicFramePr>
             <a:graphicFrameLocks noGrp="1"/>
           </p:cNvGraphicFramePr>
-          <p:nvPr/>
+          <p:nvPr>
+            <p:extLst>
+              <p:ext uri="{D42A27DB-BD31-4B8C-83A1-F6EECF244321}">
+                <p14:modId xmlns:p14="http://schemas.microsoft.com/office/powerpoint/2010/main" val="3165867744"/>
+              </p:ext>
+            </p:extLst>
+          </p:nvPr>
         </p:nvGraphicFramePr>
         <p:xfrm>
           <a:off x="1672772" y="1977535"/>
@@ -20101,8 +20222,8 @@
                     <a:lstStyle/>
                     <a:p>
                       <a:r>
-                        <a:rPr lang="en-US" dirty="0"/>
-                        <a:t>pivots</a:t>
+                        <a:rPr lang="en-US" dirty="0" smtClean="0"/>
+                        <a:t>commands</a:t>
                       </a:r>
                       <a:endParaRPr lang="ru-RU" dirty="0"/>
                     </a:p>
@@ -20122,8 +20243,8 @@
                     <a:lstStyle/>
                     <a:p>
                       <a:r>
-                        <a:rPr lang="en-US" dirty="0"/>
-                        <a:t>commands</a:t>
+                        <a:rPr lang="en-US" dirty="0" smtClean="0"/>
+                        <a:t>pivots</a:t>
                       </a:r>
                       <a:endParaRPr lang="ru-RU" dirty="0"/>
                     </a:p>
@@ -20142,7 +20263,7 @@
       </p:graphicFrame>
       <p:graphicFrame>
         <p:nvGraphicFramePr>
-          <p:cNvPr id="9" name="Table 8">
+          <p:cNvPr id="58" name="Table 57">
             <a:extLst>
               <a:ext uri="{FF2B5EF4-FFF2-40B4-BE49-F238E27FC236}">
                 <a16:creationId xmlns:a16="http://schemas.microsoft.com/office/drawing/2014/main" id="{56616A28-EA0B-5040-9804-9D852BF9C7F7}"/>
@@ -20152,7 +20273,13 @@
           <p:cNvGraphicFramePr>
             <a:graphicFrameLocks noGrp="1"/>
           </p:cNvGraphicFramePr>
-          <p:nvPr/>
+          <p:nvPr>
+            <p:extLst>
+              <p:ext uri="{D42A27DB-BD31-4B8C-83A1-F6EECF244321}">
+                <p14:modId xmlns:p14="http://schemas.microsoft.com/office/powerpoint/2010/main" val="981873522"/>
+              </p:ext>
+            </p:extLst>
+          </p:nvPr>
         </p:nvGraphicFramePr>
         <p:xfrm>
           <a:off x="3621314" y="1955763"/>
@@ -20180,8 +20307,8 @@
                     <a:lstStyle/>
                     <a:p>
                       <a:r>
-                        <a:rPr lang="en-US" dirty="0"/>
-                        <a:t>pivots</a:t>
+                        <a:rPr lang="en-US" dirty="0" smtClean="0"/>
+                        <a:t>commands</a:t>
                       </a:r>
                       <a:endParaRPr lang="ru-RU" dirty="0"/>
                     </a:p>
@@ -20201,8 +20328,8 @@
                     <a:lstStyle/>
                     <a:p>
                       <a:r>
-                        <a:rPr lang="en-US" dirty="0"/>
-                        <a:t>commands</a:t>
+                        <a:rPr lang="en-US" dirty="0" smtClean="0"/>
+                        <a:t>pivots</a:t>
                       </a:r>
                       <a:endParaRPr lang="ru-RU" dirty="0"/>
                     </a:p>
@@ -20221,7 +20348,7 @@
       </p:graphicFrame>
       <p:sp>
         <p:nvSpPr>
-          <p:cNvPr id="10" name="TextBox 9">
+          <p:cNvPr id="59" name="TextBox 58">
             <a:extLst>
               <a:ext uri="{FF2B5EF4-FFF2-40B4-BE49-F238E27FC236}">
                 <a16:creationId xmlns:a16="http://schemas.microsoft.com/office/drawing/2014/main" id="{38574764-423C-3D4F-ADFF-3EB0A75A1936}"/>
@@ -20257,7 +20384,7 @@
       </p:sp>
       <p:graphicFrame>
         <p:nvGraphicFramePr>
-          <p:cNvPr id="11" name="Table 10">
+          <p:cNvPr id="60" name="Table 59">
             <a:extLst>
               <a:ext uri="{FF2B5EF4-FFF2-40B4-BE49-F238E27FC236}">
                 <a16:creationId xmlns:a16="http://schemas.microsoft.com/office/drawing/2014/main" id="{88538589-9133-BF42-A664-05590C14C1D1}"/>
@@ -20267,7 +20394,13 @@
           <p:cNvGraphicFramePr>
             <a:graphicFrameLocks noGrp="1"/>
           </p:cNvGraphicFramePr>
-          <p:nvPr/>
+          <p:nvPr>
+            <p:extLst>
+              <p:ext uri="{D42A27DB-BD31-4B8C-83A1-F6EECF244321}">
+                <p14:modId xmlns:p14="http://schemas.microsoft.com/office/powerpoint/2010/main" val="1481492408"/>
+              </p:ext>
+            </p:extLst>
+          </p:nvPr>
         </p:nvGraphicFramePr>
         <p:xfrm>
           <a:off x="246743" y="3425578"/>
@@ -20295,8 +20428,8 @@
                     <a:lstStyle/>
                     <a:p>
                       <a:r>
-                        <a:rPr lang="en-US" dirty="0"/>
-                        <a:t>pivots</a:t>
+                        <a:rPr lang="en-US" dirty="0" smtClean="0"/>
+                        <a:t>elements</a:t>
                       </a:r>
                       <a:endParaRPr lang="ru-RU" dirty="0"/>
                     </a:p>
@@ -20315,7 +20448,7 @@
       </p:graphicFrame>
       <p:cxnSp>
         <p:nvCxnSpPr>
-          <p:cNvPr id="13" name="Straight Arrow Connector 12">
+          <p:cNvPr id="61" name="Straight Arrow Connector 60">
             <a:extLst>
               <a:ext uri="{FF2B5EF4-FFF2-40B4-BE49-F238E27FC236}">
                 <a16:creationId xmlns:a16="http://schemas.microsoft.com/office/drawing/2014/main" id="{A7876C95-A1ED-FD46-89C3-471D0885A468}"/>
@@ -20323,7 +20456,7 @@
             </a:extLst>
           </p:cNvPr>
           <p:cNvCxnSpPr>
-            <a:endCxn id="7" idx="0"/>
+            <a:endCxn id="56" idx="0"/>
           </p:cNvCxnSpPr>
           <p:nvPr/>
         </p:nvCxnSpPr>
@@ -20359,7 +20492,7 @@
       </p:cxnSp>
       <p:cxnSp>
         <p:nvCxnSpPr>
-          <p:cNvPr id="15" name="Straight Arrow Connector 14">
+          <p:cNvPr id="62" name="Straight Arrow Connector 61">
             <a:extLst>
               <a:ext uri="{FF2B5EF4-FFF2-40B4-BE49-F238E27FC236}">
                 <a16:creationId xmlns:a16="http://schemas.microsoft.com/office/drawing/2014/main" id="{8CAF3A44-9089-C54B-9ED7-27E17CF0AA32}"/>
@@ -20367,7 +20500,7 @@
             </a:extLst>
           </p:cNvPr>
           <p:cNvCxnSpPr>
-            <a:endCxn id="8" idx="0"/>
+            <a:endCxn id="57" idx="0"/>
           </p:cNvCxnSpPr>
           <p:nvPr/>
         </p:nvCxnSpPr>
@@ -20403,7 +20536,7 @@
       </p:cxnSp>
       <p:cxnSp>
         <p:nvCxnSpPr>
-          <p:cNvPr id="17" name="Straight Arrow Connector 16">
+          <p:cNvPr id="63" name="Straight Arrow Connector 62">
             <a:extLst>
               <a:ext uri="{FF2B5EF4-FFF2-40B4-BE49-F238E27FC236}">
                 <a16:creationId xmlns:a16="http://schemas.microsoft.com/office/drawing/2014/main" id="{A3DCF2CF-9BD5-E24F-9347-6F929858C999}"/>
@@ -20445,7 +20578,7 @@
       </p:cxnSp>
       <p:cxnSp>
         <p:nvCxnSpPr>
-          <p:cNvPr id="19" name="Straight Arrow Connector 18">
+          <p:cNvPr id="64" name="Straight Arrow Connector 63">
             <a:extLst>
               <a:ext uri="{FF2B5EF4-FFF2-40B4-BE49-F238E27FC236}">
                 <a16:creationId xmlns:a16="http://schemas.microsoft.com/office/drawing/2014/main" id="{8B50A883-5FE5-5140-9869-F8E784436BEE}"/>
@@ -20487,7 +20620,7 @@
       </p:cxnSp>
       <p:cxnSp>
         <p:nvCxnSpPr>
-          <p:cNvPr id="21" name="Straight Arrow Connector 20">
+          <p:cNvPr id="65" name="Straight Arrow Connector 64">
             <a:extLst>
               <a:ext uri="{FF2B5EF4-FFF2-40B4-BE49-F238E27FC236}">
                 <a16:creationId xmlns:a16="http://schemas.microsoft.com/office/drawing/2014/main" id="{7E4633B1-D72D-9743-A4D8-5E3695848B42}"/>
@@ -20496,7 +20629,7 @@
           </p:cNvPr>
           <p:cNvCxnSpPr>
             <a:cxnSpLocks/>
-            <a:endCxn id="9" idx="0"/>
+            <a:endCxn id="58" idx="0"/>
           </p:cNvCxnSpPr>
           <p:nvPr/>
         </p:nvCxnSpPr>
@@ -20532,7 +20665,7 @@
       </p:cxnSp>
       <p:cxnSp>
         <p:nvCxnSpPr>
-          <p:cNvPr id="24" name="Straight Arrow Connector 23">
+          <p:cNvPr id="66" name="Straight Arrow Connector 65">
             <a:extLst>
               <a:ext uri="{FF2B5EF4-FFF2-40B4-BE49-F238E27FC236}">
                 <a16:creationId xmlns:a16="http://schemas.microsoft.com/office/drawing/2014/main" id="{76827C7F-CD48-0943-8AEE-57210ACBD309}"/>
@@ -20541,8 +20674,8 @@
           </p:cNvPr>
           <p:cNvCxnSpPr>
             <a:cxnSpLocks/>
-            <a:stCxn id="7" idx="2"/>
-            <a:endCxn id="11" idx="0"/>
+            <a:stCxn id="56" idx="2"/>
+            <a:endCxn id="60" idx="0"/>
           </p:cNvCxnSpPr>
           <p:nvPr/>
         </p:nvCxnSpPr>
@@ -20578,7 +20711,7 @@
       </p:cxnSp>
       <p:cxnSp>
         <p:nvCxnSpPr>
-          <p:cNvPr id="26" name="Straight Arrow Connector 25">
+          <p:cNvPr id="67" name="Straight Arrow Connector 66">
             <a:extLst>
               <a:ext uri="{FF2B5EF4-FFF2-40B4-BE49-F238E27FC236}">
                 <a16:creationId xmlns:a16="http://schemas.microsoft.com/office/drawing/2014/main" id="{174232A4-8AD0-1746-BBF8-7B95F2C11B55}"/>
@@ -20622,7 +20755,7 @@
       </p:cxnSp>
       <p:cxnSp>
         <p:nvCxnSpPr>
-          <p:cNvPr id="28" name="Straight Arrow Connector 27">
+          <p:cNvPr id="68" name="Straight Arrow Connector 67">
             <a:extLst>
               <a:ext uri="{FF2B5EF4-FFF2-40B4-BE49-F238E27FC236}">
                 <a16:creationId xmlns:a16="http://schemas.microsoft.com/office/drawing/2014/main" id="{CBBE74FE-7A86-BB4C-AB69-0E3D761C5FA5}"/>
@@ -20666,7 +20799,7 @@
       </p:cxnSp>
       <p:sp>
         <p:nvSpPr>
-          <p:cNvPr id="32" name="TextBox 31">
+          <p:cNvPr id="69" name="TextBox 68">
             <a:extLst>
               <a:ext uri="{FF2B5EF4-FFF2-40B4-BE49-F238E27FC236}">
                 <a16:creationId xmlns:a16="http://schemas.microsoft.com/office/drawing/2014/main" id="{602F302C-5C3C-CA40-9EE6-2D6DAC43FC4E}"/>
@@ -20845,8 +20978,8 @@
           </a:graphicData>
         </a:graphic>
       </p:graphicFrame>
-      <mc:AlternateContent xmlns:mc="http://schemas.openxmlformats.org/markup-compatibility/2006">
-        <mc:Choice xmlns:a14="http://schemas.microsoft.com/office/drawing/2010/main" Requires="a14">
+      <mc:AlternateContent xmlns:mc="http://schemas.openxmlformats.org/markup-compatibility/2006" xmlns:a14="http://schemas.microsoft.com/office/drawing/2010/main">
+        <mc:Choice Requires="a14">
           <p:graphicFrame>
             <p:nvGraphicFramePr>
               <p:cNvPr id="2" name="Table 1"/>
@@ -21193,7 +21326,7 @@
             </a:graphic>
           </p:graphicFrame>
         </mc:Choice>
-        <mc:Fallback>
+        <mc:Fallback xmlns="">
           <p:graphicFrame>
             <p:nvGraphicFramePr>
               <p:cNvPr id="2" name="Table 1"/>
@@ -21426,7 +21559,7 @@
       </mc:AlternateContent>
       <p:graphicFrame>
         <p:nvGraphicFramePr>
-          <p:cNvPr id="4" name="Table 3">
+          <p:cNvPr id="20" name="Table 19">
             <a:extLst>
               <a:ext uri="{FF2B5EF4-FFF2-40B4-BE49-F238E27FC236}">
                 <a16:creationId xmlns:a16="http://schemas.microsoft.com/office/drawing/2014/main" id="{540BC5F5-3CBB-3C43-ACE9-142DD19D098F}"/>
@@ -21436,7 +21569,13 @@
           <p:cNvGraphicFramePr>
             <a:graphicFrameLocks noGrp="1"/>
           </p:cNvGraphicFramePr>
-          <p:nvPr/>
+          <p:nvPr>
+            <p:extLst>
+              <p:ext uri="{D42A27DB-BD31-4B8C-83A1-F6EECF244321}">
+                <p14:modId xmlns:p14="http://schemas.microsoft.com/office/powerpoint/2010/main" val="3437429520"/>
+              </p:ext>
+            </p:extLst>
+          </p:nvPr>
         </p:nvGraphicFramePr>
         <p:xfrm>
           <a:off x="1672772" y="915609"/>
@@ -21472,47 +21611,6 @@
                 </a:gridCol>
               </a:tblGrid>
               <a:tr h="370840">
-                <a:tc gridSpan="3">
-                  <a:txBody>
-                    <a:bodyPr/>
-                    <a:lstStyle/>
-                    <a:p>
-                      <a:r>
-                        <a:rPr lang="en-US" dirty="0"/>
-                        <a:t>pivots</a:t>
-                      </a:r>
-                      <a:endParaRPr lang="ru-RU" dirty="0"/>
-                    </a:p>
-                  </a:txBody>
-                  <a:tcPr/>
-                </a:tc>
-                <a:tc hMerge="1">
-                  <a:txBody>
-                    <a:bodyPr/>
-                    <a:lstStyle/>
-                    <a:p>
-                      <a:endParaRPr lang="ru-RU"/>
-                    </a:p>
-                  </a:txBody>
-                  <a:tcPr/>
-                </a:tc>
-                <a:tc hMerge="1">
-                  <a:txBody>
-                    <a:bodyPr/>
-                    <a:lstStyle/>
-                    <a:p>
-                      <a:endParaRPr lang="ru-RU"/>
-                    </a:p>
-                  </a:txBody>
-                  <a:tcPr/>
-                </a:tc>
-                <a:extLst>
-                  <a:ext uri="{0D108BD9-81ED-4DB2-BD59-A6C34878D82A}">
-                    <a16:rowId xmlns:a16="http://schemas.microsoft.com/office/drawing/2014/main" val="2904599238"/>
-                  </a:ext>
-                </a:extLst>
-              </a:tr>
-              <a:tr h="370840">
                 <a:tc>
                   <a:txBody>
                     <a:bodyPr/>
@@ -21537,7 +21635,7 @@
                   </a:txBody>
                   <a:tcPr>
                     <a:solidFill>
-                      <a:srgbClr val="FF0000"/>
+                      <a:srgbClr val="C00000"/>
                     </a:solidFill>
                   </a:tcPr>
                 </a:tc>
@@ -21557,13 +21655,60 @@
                   </a:ext>
                 </a:extLst>
               </a:tr>
+              <a:tr h="370840">
+                <a:tc gridSpan="3">
+                  <a:txBody>
+                    <a:bodyPr/>
+                    <a:lstStyle/>
+                    <a:p>
+                      <a:r>
+                        <a:rPr lang="en-US" dirty="0" smtClean="0"/>
+                        <a:t>pivots</a:t>
+                      </a:r>
+                      <a:endParaRPr lang="ru-RU" dirty="0"/>
+                    </a:p>
+                  </a:txBody>
+                  <a:tcPr>
+                    <a:noFill/>
+                  </a:tcPr>
+                </a:tc>
+                <a:tc hMerge="1">
+                  <a:txBody>
+                    <a:bodyPr/>
+                    <a:lstStyle/>
+                    <a:p>
+                      <a:endParaRPr lang="ru-RU" dirty="0"/>
+                    </a:p>
+                  </a:txBody>
+                  <a:tcPr>
+                    <a:solidFill>
+                      <a:srgbClr val="C00000"/>
+                    </a:solidFill>
+                  </a:tcPr>
+                </a:tc>
+                <a:tc hMerge="1">
+                  <a:txBody>
+                    <a:bodyPr/>
+                    <a:lstStyle/>
+                    <a:p>
+                      <a:endParaRPr lang="ru-RU" dirty="0"/>
+                    </a:p>
+                  </a:txBody>
+                  <a:tcPr/>
+                </a:tc>
+                <a:extLst>
+                  <a:ext uri="{0D108BD9-81ED-4DB2-BD59-A6C34878D82A}">
+                    <a16:rowId xmlns:a16="http://schemas.microsoft.com/office/drawing/2014/main" val="542067439"/>
+                  </a:ext>
+                </a:extLst>
+              </a:tr>
             </a:tbl>
           </a:graphicData>
         </a:graphic>
       </p:graphicFrame>
       <p:graphicFrame>
         <p:nvGraphicFramePr>
-          <p:cNvPr id="7" name="Table 6">
+          <p:cNvPr id="22" name="Table 21">
             <a:extLst>
               <a:ext uri="{FF2B5EF4-FFF2-40B4-BE49-F238E27FC236}">
                 <a16:creationId xmlns:a16="http://schemas.microsoft.com/office/drawing/2014/main" id="{2A4B87A2-6BF6-334D-B575-78F25403D403}"/>
@@ -21573,7 +21718,13 @@
           <p:cNvGraphicFramePr>
             <a:graphicFrameLocks noGrp="1"/>
           </p:cNvGraphicFramePr>
-          <p:nvPr/>
+          <p:nvPr>
+            <p:extLst>
+              <p:ext uri="{D42A27DB-BD31-4B8C-83A1-F6EECF244321}">
+                <p14:modId xmlns:p14="http://schemas.microsoft.com/office/powerpoint/2010/main" val="3244199746"/>
+              </p:ext>
+            </p:extLst>
+          </p:nvPr>
         </p:nvGraphicFramePr>
         <p:xfrm>
           <a:off x="246743" y="1993294"/>
@@ -21601,8 +21752,8 @@
                     <a:lstStyle/>
                     <a:p>
                       <a:r>
-                        <a:rPr lang="en-US" dirty="0"/>
-                        <a:t>pivots</a:t>
+                        <a:rPr lang="en-US" dirty="0" smtClean="0"/>
+                        <a:t>commands</a:t>
                       </a:r>
                       <a:endParaRPr lang="ru-RU" dirty="0"/>
                     </a:p>
@@ -21622,8 +21773,8 @@
                     <a:lstStyle/>
                     <a:p>
                       <a:r>
-                        <a:rPr lang="en-US" dirty="0"/>
-                        <a:t>commands</a:t>
+                        <a:rPr lang="en-US" dirty="0" smtClean="0"/>
+                        <a:t>pivots</a:t>
                       </a:r>
                       <a:endParaRPr lang="ru-RU" dirty="0"/>
                     </a:p>
@@ -21642,7 +21793,7 @@
       </p:graphicFrame>
       <p:graphicFrame>
         <p:nvGraphicFramePr>
-          <p:cNvPr id="8" name="Table 7">
+          <p:cNvPr id="23" name="Table 22">
             <a:extLst>
               <a:ext uri="{FF2B5EF4-FFF2-40B4-BE49-F238E27FC236}">
                 <a16:creationId xmlns:a16="http://schemas.microsoft.com/office/drawing/2014/main" id="{4477A714-9D80-3B43-A7C9-3FA93857301E}"/>
@@ -21652,7 +21803,13 @@
           <p:cNvGraphicFramePr>
             <a:graphicFrameLocks noGrp="1"/>
           </p:cNvGraphicFramePr>
-          <p:nvPr/>
+          <p:nvPr>
+            <p:extLst>
+              <p:ext uri="{D42A27DB-BD31-4B8C-83A1-F6EECF244321}">
+                <p14:modId xmlns:p14="http://schemas.microsoft.com/office/powerpoint/2010/main" val="3165867744"/>
+              </p:ext>
+            </p:extLst>
+          </p:nvPr>
         </p:nvGraphicFramePr>
         <p:xfrm>
           <a:off x="1672772" y="1977535"/>
@@ -21680,8 +21837,8 @@
                     <a:lstStyle/>
                     <a:p>
                       <a:r>
-                        <a:rPr lang="en-US" dirty="0"/>
-                        <a:t>pivots</a:t>
+                        <a:rPr lang="en-US" dirty="0" smtClean="0"/>
+                        <a:t>commands</a:t>
                       </a:r>
                       <a:endParaRPr lang="ru-RU" dirty="0"/>
                     </a:p>
@@ -21701,8 +21858,8 @@
                     <a:lstStyle/>
                     <a:p>
                       <a:r>
-                        <a:rPr lang="en-US" dirty="0"/>
-                        <a:t>commands</a:t>
+                        <a:rPr lang="en-US" dirty="0" smtClean="0"/>
+                        <a:t>pivots</a:t>
                       </a:r>
                       <a:endParaRPr lang="ru-RU" dirty="0"/>
                     </a:p>
@@ -21721,7 +21878,7 @@
       </p:graphicFrame>
       <p:graphicFrame>
         <p:nvGraphicFramePr>
-          <p:cNvPr id="9" name="Table 8">
+          <p:cNvPr id="25" name="Table 24">
             <a:extLst>
               <a:ext uri="{FF2B5EF4-FFF2-40B4-BE49-F238E27FC236}">
                 <a16:creationId xmlns:a16="http://schemas.microsoft.com/office/drawing/2014/main" id="{56616A28-EA0B-5040-9804-9D852BF9C7F7}"/>
@@ -21731,7 +21888,13 @@
           <p:cNvGraphicFramePr>
             <a:graphicFrameLocks noGrp="1"/>
           </p:cNvGraphicFramePr>
-          <p:nvPr/>
+          <p:nvPr>
+            <p:extLst>
+              <p:ext uri="{D42A27DB-BD31-4B8C-83A1-F6EECF244321}">
+                <p14:modId xmlns:p14="http://schemas.microsoft.com/office/powerpoint/2010/main" val="981873522"/>
+              </p:ext>
+            </p:extLst>
+          </p:nvPr>
         </p:nvGraphicFramePr>
         <p:xfrm>
           <a:off x="3621314" y="1955763"/>
@@ -21759,8 +21922,8 @@
                     <a:lstStyle/>
                     <a:p>
                       <a:r>
-                        <a:rPr lang="en-US" dirty="0"/>
-                        <a:t>pivots</a:t>
+                        <a:rPr lang="en-US" dirty="0" smtClean="0"/>
+                        <a:t>commands</a:t>
                       </a:r>
                       <a:endParaRPr lang="ru-RU" dirty="0"/>
                     </a:p>
@@ -21780,8 +21943,8 @@
                     <a:lstStyle/>
                     <a:p>
                       <a:r>
-                        <a:rPr lang="en-US" dirty="0"/>
-                        <a:t>commands</a:t>
+                        <a:rPr lang="en-US" dirty="0" smtClean="0"/>
+                        <a:t>pivots</a:t>
                       </a:r>
                       <a:endParaRPr lang="ru-RU" dirty="0"/>
                     </a:p>
@@ -21800,7 +21963,7 @@
       </p:graphicFrame>
       <p:sp>
         <p:nvSpPr>
-          <p:cNvPr id="10" name="TextBox 9">
+          <p:cNvPr id="27" name="TextBox 26">
             <a:extLst>
               <a:ext uri="{FF2B5EF4-FFF2-40B4-BE49-F238E27FC236}">
                 <a16:creationId xmlns:a16="http://schemas.microsoft.com/office/drawing/2014/main" id="{38574764-423C-3D4F-ADFF-3EB0A75A1936}"/>
@@ -21836,7 +21999,7 @@
       </p:sp>
       <p:graphicFrame>
         <p:nvGraphicFramePr>
-          <p:cNvPr id="11" name="Table 10">
+          <p:cNvPr id="29" name="Table 28">
             <a:extLst>
               <a:ext uri="{FF2B5EF4-FFF2-40B4-BE49-F238E27FC236}">
                 <a16:creationId xmlns:a16="http://schemas.microsoft.com/office/drawing/2014/main" id="{88538589-9133-BF42-A664-05590C14C1D1}"/>
@@ -21846,7 +22009,13 @@
           <p:cNvGraphicFramePr>
             <a:graphicFrameLocks noGrp="1"/>
           </p:cNvGraphicFramePr>
-          <p:nvPr/>
+          <p:nvPr>
+            <p:extLst>
+              <p:ext uri="{D42A27DB-BD31-4B8C-83A1-F6EECF244321}">
+                <p14:modId xmlns:p14="http://schemas.microsoft.com/office/powerpoint/2010/main" val="1481492408"/>
+              </p:ext>
+            </p:extLst>
+          </p:nvPr>
         </p:nvGraphicFramePr>
         <p:xfrm>
           <a:off x="246743" y="3425578"/>
@@ -21874,8 +22043,8 @@
                     <a:lstStyle/>
                     <a:p>
                       <a:r>
-                        <a:rPr lang="en-US" dirty="0"/>
-                        <a:t>pivots</a:t>
+                        <a:rPr lang="en-US" dirty="0" smtClean="0"/>
+                        <a:t>elements</a:t>
                       </a:r>
                       <a:endParaRPr lang="ru-RU" dirty="0"/>
                     </a:p>
@@ -21894,7 +22063,7 @@
       </p:graphicFrame>
       <p:cxnSp>
         <p:nvCxnSpPr>
-          <p:cNvPr id="13" name="Straight Arrow Connector 12">
+          <p:cNvPr id="30" name="Straight Arrow Connector 29">
             <a:extLst>
               <a:ext uri="{FF2B5EF4-FFF2-40B4-BE49-F238E27FC236}">
                 <a16:creationId xmlns:a16="http://schemas.microsoft.com/office/drawing/2014/main" id="{A7876C95-A1ED-FD46-89C3-471D0885A468}"/>
@@ -21902,7 +22071,7 @@
             </a:extLst>
           </p:cNvPr>
           <p:cNvCxnSpPr>
-            <a:endCxn id="7" idx="0"/>
+            <a:endCxn id="22" idx="0"/>
           </p:cNvCxnSpPr>
           <p:nvPr/>
         </p:nvCxnSpPr>
@@ -21938,7 +22107,7 @@
       </p:cxnSp>
       <p:cxnSp>
         <p:nvCxnSpPr>
-          <p:cNvPr id="15" name="Straight Arrow Connector 14">
+          <p:cNvPr id="31" name="Straight Arrow Connector 30">
             <a:extLst>
               <a:ext uri="{FF2B5EF4-FFF2-40B4-BE49-F238E27FC236}">
                 <a16:creationId xmlns:a16="http://schemas.microsoft.com/office/drawing/2014/main" id="{8CAF3A44-9089-C54B-9ED7-27E17CF0AA32}"/>
@@ -21946,7 +22115,7 @@
             </a:extLst>
           </p:cNvPr>
           <p:cNvCxnSpPr>
-            <a:endCxn id="8" idx="0"/>
+            <a:endCxn id="23" idx="0"/>
           </p:cNvCxnSpPr>
           <p:nvPr/>
         </p:nvCxnSpPr>
@@ -21982,7 +22151,7 @@
       </p:cxnSp>
       <p:cxnSp>
         <p:nvCxnSpPr>
-          <p:cNvPr id="17" name="Straight Arrow Connector 16">
+          <p:cNvPr id="33" name="Straight Arrow Connector 32">
             <a:extLst>
               <a:ext uri="{FF2B5EF4-FFF2-40B4-BE49-F238E27FC236}">
                 <a16:creationId xmlns:a16="http://schemas.microsoft.com/office/drawing/2014/main" id="{A3DCF2CF-9BD5-E24F-9347-6F929858C999}"/>
@@ -22024,7 +22193,7 @@
       </p:cxnSp>
       <p:cxnSp>
         <p:nvCxnSpPr>
-          <p:cNvPr id="19" name="Straight Arrow Connector 18">
+          <p:cNvPr id="34" name="Straight Arrow Connector 33">
             <a:extLst>
               <a:ext uri="{FF2B5EF4-FFF2-40B4-BE49-F238E27FC236}">
                 <a16:creationId xmlns:a16="http://schemas.microsoft.com/office/drawing/2014/main" id="{8B50A883-5FE5-5140-9869-F8E784436BEE}"/>
@@ -22066,7 +22235,7 @@
       </p:cxnSp>
       <p:cxnSp>
         <p:nvCxnSpPr>
-          <p:cNvPr id="21" name="Straight Arrow Connector 20">
+          <p:cNvPr id="35" name="Straight Arrow Connector 34">
             <a:extLst>
               <a:ext uri="{FF2B5EF4-FFF2-40B4-BE49-F238E27FC236}">
                 <a16:creationId xmlns:a16="http://schemas.microsoft.com/office/drawing/2014/main" id="{7E4633B1-D72D-9743-A4D8-5E3695848B42}"/>
@@ -22075,7 +22244,7 @@
           </p:cNvPr>
           <p:cNvCxnSpPr>
             <a:cxnSpLocks/>
-            <a:endCxn id="9" idx="0"/>
+            <a:endCxn id="25" idx="0"/>
           </p:cNvCxnSpPr>
           <p:nvPr/>
         </p:nvCxnSpPr>
@@ -22111,7 +22280,7 @@
       </p:cxnSp>
       <p:cxnSp>
         <p:nvCxnSpPr>
-          <p:cNvPr id="24" name="Straight Arrow Connector 23">
+          <p:cNvPr id="36" name="Straight Arrow Connector 35">
             <a:extLst>
               <a:ext uri="{FF2B5EF4-FFF2-40B4-BE49-F238E27FC236}">
                 <a16:creationId xmlns:a16="http://schemas.microsoft.com/office/drawing/2014/main" id="{76827C7F-CD48-0943-8AEE-57210ACBD309}"/>
@@ -22120,8 +22289,8 @@
           </p:cNvPr>
           <p:cNvCxnSpPr>
             <a:cxnSpLocks/>
-            <a:stCxn id="7" idx="2"/>
-            <a:endCxn id="11" idx="0"/>
+            <a:stCxn id="22" idx="2"/>
+            <a:endCxn id="29" idx="0"/>
           </p:cNvCxnSpPr>
           <p:nvPr/>
         </p:nvCxnSpPr>
@@ -22157,7 +22326,7 @@
       </p:cxnSp>
       <p:cxnSp>
         <p:nvCxnSpPr>
-          <p:cNvPr id="26" name="Straight Arrow Connector 25">
+          <p:cNvPr id="37" name="Straight Arrow Connector 36">
             <a:extLst>
               <a:ext uri="{FF2B5EF4-FFF2-40B4-BE49-F238E27FC236}">
                 <a16:creationId xmlns:a16="http://schemas.microsoft.com/office/drawing/2014/main" id="{174232A4-8AD0-1746-BBF8-7B95F2C11B55}"/>
@@ -22201,7 +22370,7 @@
       </p:cxnSp>
       <p:cxnSp>
         <p:nvCxnSpPr>
-          <p:cNvPr id="28" name="Straight Arrow Connector 27">
+          <p:cNvPr id="38" name="Straight Arrow Connector 37">
             <a:extLst>
               <a:ext uri="{FF2B5EF4-FFF2-40B4-BE49-F238E27FC236}">
                 <a16:creationId xmlns:a16="http://schemas.microsoft.com/office/drawing/2014/main" id="{CBBE74FE-7A86-BB4C-AB69-0E3D761C5FA5}"/>
@@ -22245,7 +22414,7 @@
       </p:cxnSp>
       <p:sp>
         <p:nvSpPr>
-          <p:cNvPr id="32" name="TextBox 31">
+          <p:cNvPr id="39" name="TextBox 38">
             <a:extLst>
               <a:ext uri="{FF2B5EF4-FFF2-40B4-BE49-F238E27FC236}">
                 <a16:creationId xmlns:a16="http://schemas.microsoft.com/office/drawing/2014/main" id="{602F302C-5C3C-CA40-9EE6-2D6DAC43FC4E}"/>
@@ -22424,8 +22593,8 @@
           </a:graphicData>
         </a:graphic>
       </p:graphicFrame>
-      <mc:AlternateContent xmlns:mc="http://schemas.openxmlformats.org/markup-compatibility/2006">
-        <mc:Choice xmlns:a14="http://schemas.microsoft.com/office/drawing/2010/main" Requires="a14">
+      <mc:AlternateContent xmlns:mc="http://schemas.openxmlformats.org/markup-compatibility/2006" xmlns:a14="http://schemas.microsoft.com/office/drawing/2010/main">
+        <mc:Choice Requires="a14">
           <p:graphicFrame>
             <p:nvGraphicFramePr>
               <p:cNvPr id="2" name="Table 1"/>
@@ -22862,7 +23031,7 @@
             </a:graphic>
           </p:graphicFrame>
         </mc:Choice>
-        <mc:Fallback>
+        <mc:Fallback xmlns="">
           <p:graphicFrame>
             <p:nvGraphicFramePr>
               <p:cNvPr id="2" name="Table 1"/>
@@ -23095,7 +23264,7 @@
       </mc:AlternateContent>
       <p:graphicFrame>
         <p:nvGraphicFramePr>
-          <p:cNvPr id="4" name="Table 3">
+          <p:cNvPr id="20" name="Table 19">
             <a:extLst>
               <a:ext uri="{FF2B5EF4-FFF2-40B4-BE49-F238E27FC236}">
                 <a16:creationId xmlns:a16="http://schemas.microsoft.com/office/drawing/2014/main" id="{540BC5F5-3CBB-3C43-ACE9-142DD19D098F}"/>
@@ -23105,7 +23274,13 @@
           <p:cNvGraphicFramePr>
             <a:graphicFrameLocks noGrp="1"/>
           </p:cNvGraphicFramePr>
-          <p:nvPr/>
+          <p:nvPr>
+            <p:extLst>
+              <p:ext uri="{D42A27DB-BD31-4B8C-83A1-F6EECF244321}">
+                <p14:modId xmlns:p14="http://schemas.microsoft.com/office/powerpoint/2010/main" val="3437429520"/>
+              </p:ext>
+            </p:extLst>
+          </p:nvPr>
         </p:nvGraphicFramePr>
         <p:xfrm>
           <a:off x="1672772" y="915609"/>
@@ -23141,47 +23316,6 @@
                 </a:gridCol>
               </a:tblGrid>
               <a:tr h="370840">
-                <a:tc gridSpan="3">
-                  <a:txBody>
-                    <a:bodyPr/>
-                    <a:lstStyle/>
-                    <a:p>
-                      <a:r>
-                        <a:rPr lang="en-US" dirty="0"/>
-                        <a:t>pivots</a:t>
-                      </a:r>
-                      <a:endParaRPr lang="ru-RU" dirty="0"/>
-                    </a:p>
-                  </a:txBody>
-                  <a:tcPr/>
-                </a:tc>
-                <a:tc hMerge="1">
-                  <a:txBody>
-                    <a:bodyPr/>
-                    <a:lstStyle/>
-                    <a:p>
-                      <a:endParaRPr lang="ru-RU"/>
-                    </a:p>
-                  </a:txBody>
-                  <a:tcPr/>
-                </a:tc>
-                <a:tc hMerge="1">
-                  <a:txBody>
-                    <a:bodyPr/>
-                    <a:lstStyle/>
-                    <a:p>
-                      <a:endParaRPr lang="ru-RU"/>
-                    </a:p>
-                  </a:txBody>
-                  <a:tcPr/>
-                </a:tc>
-                <a:extLst>
-                  <a:ext uri="{0D108BD9-81ED-4DB2-BD59-A6C34878D82A}">
-                    <a16:rowId xmlns:a16="http://schemas.microsoft.com/office/drawing/2014/main" val="2904599238"/>
-                  </a:ext>
-                </a:extLst>
-              </a:tr>
-              <a:tr h="370840">
                 <a:tc>
                   <a:txBody>
                     <a:bodyPr/>
@@ -23206,7 +23340,7 @@
                   </a:txBody>
                   <a:tcPr>
                     <a:solidFill>
-                      <a:srgbClr val="FF0000"/>
+                      <a:srgbClr val="C00000"/>
                     </a:solidFill>
                   </a:tcPr>
                 </a:tc>
@@ -23226,13 +23360,60 @@
                   </a:ext>
                 </a:extLst>
               </a:tr>
+              <a:tr h="370840">
+                <a:tc gridSpan="3">
+                  <a:txBody>
+                    <a:bodyPr/>
+                    <a:lstStyle/>
+                    <a:p>
+                      <a:r>
+                        <a:rPr lang="en-US" dirty="0" smtClean="0"/>
+                        <a:t>pivots</a:t>
+                      </a:r>
+                      <a:endParaRPr lang="ru-RU" dirty="0"/>
+                    </a:p>
+                  </a:txBody>
+                  <a:tcPr>
+                    <a:noFill/>
+                  </a:tcPr>
+                </a:tc>
+                <a:tc hMerge="1">
+                  <a:txBody>
+                    <a:bodyPr/>
+                    <a:lstStyle/>
+                    <a:p>
+                      <a:endParaRPr lang="ru-RU" dirty="0"/>
+                    </a:p>
+                  </a:txBody>
+                  <a:tcPr>
+                    <a:solidFill>
+                      <a:srgbClr val="C00000"/>
+                    </a:solidFill>
+                  </a:tcPr>
+                </a:tc>
+                <a:tc hMerge="1">
+                  <a:txBody>
+                    <a:bodyPr/>
+                    <a:lstStyle/>
+                    <a:p>
+                      <a:endParaRPr lang="ru-RU" dirty="0"/>
+                    </a:p>
+                  </a:txBody>
+                  <a:tcPr/>
+                </a:tc>
+                <a:extLst>
+                  <a:ext uri="{0D108BD9-81ED-4DB2-BD59-A6C34878D82A}">
+                    <a16:rowId xmlns:a16="http://schemas.microsoft.com/office/drawing/2014/main" val="542067439"/>
+                  </a:ext>
+                </a:extLst>
+              </a:tr>
             </a:tbl>
           </a:graphicData>
         </a:graphic>
       </p:graphicFrame>
       <p:graphicFrame>
         <p:nvGraphicFramePr>
-          <p:cNvPr id="7" name="Table 6">
+          <p:cNvPr id="22" name="Table 21">
             <a:extLst>
               <a:ext uri="{FF2B5EF4-FFF2-40B4-BE49-F238E27FC236}">
                 <a16:creationId xmlns:a16="http://schemas.microsoft.com/office/drawing/2014/main" id="{2A4B87A2-6BF6-334D-B575-78F25403D403}"/>
@@ -23242,7 +23423,13 @@
           <p:cNvGraphicFramePr>
             <a:graphicFrameLocks noGrp="1"/>
           </p:cNvGraphicFramePr>
-          <p:nvPr/>
+          <p:nvPr>
+            <p:extLst>
+              <p:ext uri="{D42A27DB-BD31-4B8C-83A1-F6EECF244321}">
+                <p14:modId xmlns:p14="http://schemas.microsoft.com/office/powerpoint/2010/main" val="3244199746"/>
+              </p:ext>
+            </p:extLst>
+          </p:nvPr>
         </p:nvGraphicFramePr>
         <p:xfrm>
           <a:off x="246743" y="1993294"/>
@@ -23270,8 +23457,8 @@
                     <a:lstStyle/>
                     <a:p>
                       <a:r>
-                        <a:rPr lang="en-US" dirty="0"/>
-                        <a:t>pivots</a:t>
+                        <a:rPr lang="en-US" dirty="0" smtClean="0"/>
+                        <a:t>commands</a:t>
                       </a:r>
                       <a:endParaRPr lang="ru-RU" dirty="0"/>
                     </a:p>
@@ -23291,8 +23478,8 @@
                     <a:lstStyle/>
                     <a:p>
                       <a:r>
-                        <a:rPr lang="en-US" dirty="0"/>
-                        <a:t>commands</a:t>
+                        <a:rPr lang="en-US" dirty="0" smtClean="0"/>
+                        <a:t>pivots</a:t>
                       </a:r>
                       <a:endParaRPr lang="ru-RU" dirty="0"/>
                     </a:p>
@@ -23311,7 +23498,7 @@
       </p:graphicFrame>
       <p:graphicFrame>
         <p:nvGraphicFramePr>
-          <p:cNvPr id="8" name="Table 7">
+          <p:cNvPr id="23" name="Table 22">
             <a:extLst>
               <a:ext uri="{FF2B5EF4-FFF2-40B4-BE49-F238E27FC236}">
                 <a16:creationId xmlns:a16="http://schemas.microsoft.com/office/drawing/2014/main" id="{4477A714-9D80-3B43-A7C9-3FA93857301E}"/>
@@ -23321,7 +23508,13 @@
           <p:cNvGraphicFramePr>
             <a:graphicFrameLocks noGrp="1"/>
           </p:cNvGraphicFramePr>
-          <p:nvPr/>
+          <p:nvPr>
+            <p:extLst>
+              <p:ext uri="{D42A27DB-BD31-4B8C-83A1-F6EECF244321}">
+                <p14:modId xmlns:p14="http://schemas.microsoft.com/office/powerpoint/2010/main" val="3165867744"/>
+              </p:ext>
+            </p:extLst>
+          </p:nvPr>
         </p:nvGraphicFramePr>
         <p:xfrm>
           <a:off x="1672772" y="1977535"/>
@@ -23349,8 +23542,8 @@
                     <a:lstStyle/>
                     <a:p>
                       <a:r>
-                        <a:rPr lang="en-US" dirty="0"/>
-                        <a:t>pivots</a:t>
+                        <a:rPr lang="en-US" dirty="0" smtClean="0"/>
+                        <a:t>commands</a:t>
                       </a:r>
                       <a:endParaRPr lang="ru-RU" dirty="0"/>
                     </a:p>
@@ -23370,8 +23563,8 @@
                     <a:lstStyle/>
                     <a:p>
                       <a:r>
-                        <a:rPr lang="en-US" dirty="0"/>
-                        <a:t>commands</a:t>
+                        <a:rPr lang="en-US" dirty="0" smtClean="0"/>
+                        <a:t>pivots</a:t>
                       </a:r>
                       <a:endParaRPr lang="ru-RU" dirty="0"/>
                     </a:p>
@@ -23390,7 +23583,7 @@
       </p:graphicFrame>
       <p:graphicFrame>
         <p:nvGraphicFramePr>
-          <p:cNvPr id="9" name="Table 8">
+          <p:cNvPr id="25" name="Table 24">
             <a:extLst>
               <a:ext uri="{FF2B5EF4-FFF2-40B4-BE49-F238E27FC236}">
                 <a16:creationId xmlns:a16="http://schemas.microsoft.com/office/drawing/2014/main" id="{56616A28-EA0B-5040-9804-9D852BF9C7F7}"/>
@@ -23400,7 +23593,13 @@
           <p:cNvGraphicFramePr>
             <a:graphicFrameLocks noGrp="1"/>
           </p:cNvGraphicFramePr>
-          <p:nvPr/>
+          <p:nvPr>
+            <p:extLst>
+              <p:ext uri="{D42A27DB-BD31-4B8C-83A1-F6EECF244321}">
+                <p14:modId xmlns:p14="http://schemas.microsoft.com/office/powerpoint/2010/main" val="981873522"/>
+              </p:ext>
+            </p:extLst>
+          </p:nvPr>
         </p:nvGraphicFramePr>
         <p:xfrm>
           <a:off x="3621314" y="1955763"/>
@@ -23428,8 +23627,8 @@
                     <a:lstStyle/>
                     <a:p>
                       <a:r>
-                        <a:rPr lang="en-US" dirty="0"/>
-                        <a:t>pivots</a:t>
+                        <a:rPr lang="en-US" dirty="0" smtClean="0"/>
+                        <a:t>commands</a:t>
                       </a:r>
                       <a:endParaRPr lang="ru-RU" dirty="0"/>
                     </a:p>
@@ -23449,8 +23648,8 @@
                     <a:lstStyle/>
                     <a:p>
                       <a:r>
-                        <a:rPr lang="en-US" dirty="0"/>
-                        <a:t>commands</a:t>
+                        <a:rPr lang="en-US" dirty="0" smtClean="0"/>
+                        <a:t>pivots</a:t>
                       </a:r>
                       <a:endParaRPr lang="ru-RU" dirty="0"/>
                     </a:p>
@@ -23469,7 +23668,7 @@
       </p:graphicFrame>
       <p:sp>
         <p:nvSpPr>
-          <p:cNvPr id="10" name="TextBox 9">
+          <p:cNvPr id="27" name="TextBox 26">
             <a:extLst>
               <a:ext uri="{FF2B5EF4-FFF2-40B4-BE49-F238E27FC236}">
                 <a16:creationId xmlns:a16="http://schemas.microsoft.com/office/drawing/2014/main" id="{38574764-423C-3D4F-ADFF-3EB0A75A1936}"/>
@@ -23505,7 +23704,7 @@
       </p:sp>
       <p:graphicFrame>
         <p:nvGraphicFramePr>
-          <p:cNvPr id="11" name="Table 10">
+          <p:cNvPr id="29" name="Table 28">
             <a:extLst>
               <a:ext uri="{FF2B5EF4-FFF2-40B4-BE49-F238E27FC236}">
                 <a16:creationId xmlns:a16="http://schemas.microsoft.com/office/drawing/2014/main" id="{88538589-9133-BF42-A664-05590C14C1D1}"/>
@@ -23515,7 +23714,13 @@
           <p:cNvGraphicFramePr>
             <a:graphicFrameLocks noGrp="1"/>
           </p:cNvGraphicFramePr>
-          <p:nvPr/>
+          <p:nvPr>
+            <p:extLst>
+              <p:ext uri="{D42A27DB-BD31-4B8C-83A1-F6EECF244321}">
+                <p14:modId xmlns:p14="http://schemas.microsoft.com/office/powerpoint/2010/main" val="1481492408"/>
+              </p:ext>
+            </p:extLst>
+          </p:nvPr>
         </p:nvGraphicFramePr>
         <p:xfrm>
           <a:off x="246743" y="3425578"/>
@@ -23543,8 +23748,8 @@
                     <a:lstStyle/>
                     <a:p>
                       <a:r>
-                        <a:rPr lang="en-US" dirty="0"/>
-                        <a:t>pivots</a:t>
+                        <a:rPr lang="en-US" dirty="0" smtClean="0"/>
+                        <a:t>elements</a:t>
                       </a:r>
                       <a:endParaRPr lang="ru-RU" dirty="0"/>
                     </a:p>
@@ -23563,7 +23768,7 @@
       </p:graphicFrame>
       <p:cxnSp>
         <p:nvCxnSpPr>
-          <p:cNvPr id="13" name="Straight Arrow Connector 12">
+          <p:cNvPr id="30" name="Straight Arrow Connector 29">
             <a:extLst>
               <a:ext uri="{FF2B5EF4-FFF2-40B4-BE49-F238E27FC236}">
                 <a16:creationId xmlns:a16="http://schemas.microsoft.com/office/drawing/2014/main" id="{A7876C95-A1ED-FD46-89C3-471D0885A468}"/>
@@ -23571,7 +23776,7 @@
             </a:extLst>
           </p:cNvPr>
           <p:cNvCxnSpPr>
-            <a:endCxn id="7" idx="0"/>
+            <a:endCxn id="22" idx="0"/>
           </p:cNvCxnSpPr>
           <p:nvPr/>
         </p:nvCxnSpPr>
@@ -23607,7 +23812,7 @@
       </p:cxnSp>
       <p:cxnSp>
         <p:nvCxnSpPr>
-          <p:cNvPr id="15" name="Straight Arrow Connector 14">
+          <p:cNvPr id="31" name="Straight Arrow Connector 30">
             <a:extLst>
               <a:ext uri="{FF2B5EF4-FFF2-40B4-BE49-F238E27FC236}">
                 <a16:creationId xmlns:a16="http://schemas.microsoft.com/office/drawing/2014/main" id="{8CAF3A44-9089-C54B-9ED7-27E17CF0AA32}"/>
@@ -23615,7 +23820,7 @@
             </a:extLst>
           </p:cNvPr>
           <p:cNvCxnSpPr>
-            <a:endCxn id="8" idx="0"/>
+            <a:endCxn id="23" idx="0"/>
           </p:cNvCxnSpPr>
           <p:nvPr/>
         </p:nvCxnSpPr>
@@ -23651,7 +23856,7 @@
       </p:cxnSp>
       <p:cxnSp>
         <p:nvCxnSpPr>
-          <p:cNvPr id="17" name="Straight Arrow Connector 16">
+          <p:cNvPr id="33" name="Straight Arrow Connector 32">
             <a:extLst>
               <a:ext uri="{FF2B5EF4-FFF2-40B4-BE49-F238E27FC236}">
                 <a16:creationId xmlns:a16="http://schemas.microsoft.com/office/drawing/2014/main" id="{A3DCF2CF-9BD5-E24F-9347-6F929858C999}"/>
@@ -23693,7 +23898,7 @@
       </p:cxnSp>
       <p:cxnSp>
         <p:nvCxnSpPr>
-          <p:cNvPr id="19" name="Straight Arrow Connector 18">
+          <p:cNvPr id="34" name="Straight Arrow Connector 33">
             <a:extLst>
               <a:ext uri="{FF2B5EF4-FFF2-40B4-BE49-F238E27FC236}">
                 <a16:creationId xmlns:a16="http://schemas.microsoft.com/office/drawing/2014/main" id="{8B50A883-5FE5-5140-9869-F8E784436BEE}"/>
@@ -23735,7 +23940,7 @@
       </p:cxnSp>
       <p:cxnSp>
         <p:nvCxnSpPr>
-          <p:cNvPr id="21" name="Straight Arrow Connector 20">
+          <p:cNvPr id="35" name="Straight Arrow Connector 34">
             <a:extLst>
               <a:ext uri="{FF2B5EF4-FFF2-40B4-BE49-F238E27FC236}">
                 <a16:creationId xmlns:a16="http://schemas.microsoft.com/office/drawing/2014/main" id="{7E4633B1-D72D-9743-A4D8-5E3695848B42}"/>
@@ -23744,7 +23949,7 @@
           </p:cNvPr>
           <p:cNvCxnSpPr>
             <a:cxnSpLocks/>
-            <a:endCxn id="9" idx="0"/>
+            <a:endCxn id="25" idx="0"/>
           </p:cNvCxnSpPr>
           <p:nvPr/>
         </p:nvCxnSpPr>
@@ -23780,7 +23985,7 @@
       </p:cxnSp>
       <p:cxnSp>
         <p:nvCxnSpPr>
-          <p:cNvPr id="24" name="Straight Arrow Connector 23">
+          <p:cNvPr id="36" name="Straight Arrow Connector 35">
             <a:extLst>
               <a:ext uri="{FF2B5EF4-FFF2-40B4-BE49-F238E27FC236}">
                 <a16:creationId xmlns:a16="http://schemas.microsoft.com/office/drawing/2014/main" id="{76827C7F-CD48-0943-8AEE-57210ACBD309}"/>
@@ -23789,8 +23994,8 @@
           </p:cNvPr>
           <p:cNvCxnSpPr>
             <a:cxnSpLocks/>
-            <a:stCxn id="7" idx="2"/>
-            <a:endCxn id="11" idx="0"/>
+            <a:stCxn id="22" idx="2"/>
+            <a:endCxn id="29" idx="0"/>
           </p:cNvCxnSpPr>
           <p:nvPr/>
         </p:nvCxnSpPr>
@@ -23826,7 +24031,7 @@
       </p:cxnSp>
       <p:cxnSp>
         <p:nvCxnSpPr>
-          <p:cNvPr id="26" name="Straight Arrow Connector 25">
+          <p:cNvPr id="37" name="Straight Arrow Connector 36">
             <a:extLst>
               <a:ext uri="{FF2B5EF4-FFF2-40B4-BE49-F238E27FC236}">
                 <a16:creationId xmlns:a16="http://schemas.microsoft.com/office/drawing/2014/main" id="{174232A4-8AD0-1746-BBF8-7B95F2C11B55}"/>
@@ -23870,7 +24075,7 @@
       </p:cxnSp>
       <p:cxnSp>
         <p:nvCxnSpPr>
-          <p:cNvPr id="28" name="Straight Arrow Connector 27">
+          <p:cNvPr id="38" name="Straight Arrow Connector 37">
             <a:extLst>
               <a:ext uri="{FF2B5EF4-FFF2-40B4-BE49-F238E27FC236}">
                 <a16:creationId xmlns:a16="http://schemas.microsoft.com/office/drawing/2014/main" id="{CBBE74FE-7A86-BB4C-AB69-0E3D761C5FA5}"/>
@@ -23914,7 +24119,7 @@
       </p:cxnSp>
       <p:sp>
         <p:nvSpPr>
-          <p:cNvPr id="32" name="TextBox 31">
+          <p:cNvPr id="39" name="TextBox 38">
             <a:extLst>
               <a:ext uri="{FF2B5EF4-FFF2-40B4-BE49-F238E27FC236}">
                 <a16:creationId xmlns:a16="http://schemas.microsoft.com/office/drawing/2014/main" id="{602F302C-5C3C-CA40-9EE6-2D6DAC43FC4E}"/>
@@ -24104,7 +24309,7 @@
               <p:nvPr>
                 <p:extLst>
                   <p:ext uri="{D42A27DB-BD31-4B8C-83A1-F6EECF244321}">
-                    <p14:modId xmlns:p14="http://schemas.microsoft.com/office/powerpoint/2010/main" val="2532779601"/>
+                    <p14:modId xmlns:p14="http://schemas.microsoft.com/office/powerpoint/2010/main" val="3360049247"/>
                   </p:ext>
                 </p:extLst>
               </p:nvPr>
@@ -24568,7 +24773,15 @@
                           </a:r>
                           <a:r>
                             <a:rPr lang="ru-RU" b="0" baseline="0" dirty="0"/>
-                            <a:t>выполняется второй раз, то эта она начинается со старого </a:t>
+                            <a:t>выполняется второй раз, то </a:t>
+                          </a:r>
+                          <a:r>
+                            <a:rPr lang="ru-RU" b="0" baseline="0" dirty="0" smtClean="0"/>
+                            <a:t>она </a:t>
+                          </a:r>
+                          <a:r>
+                            <a:rPr lang="ru-RU" b="0" baseline="0" dirty="0"/>
+                            <a:t>начинается со старого </a:t>
                           </a:r>
                           <a:r>
                             <a:rPr lang="ru-RU" b="0" baseline="0" dirty="0" err="1"/>
@@ -24607,7 +24820,7 @@
               <p:nvPr>
                 <p:extLst>
                   <p:ext uri="{D42A27DB-BD31-4B8C-83A1-F6EECF244321}">
-                    <p14:modId xmlns:p14="http://schemas.microsoft.com/office/powerpoint/2010/main" val="2532779601"/>
+                    <p14:modId xmlns:p14="http://schemas.microsoft.com/office/powerpoint/2010/main" val="3360049247"/>
                   </p:ext>
                 </p:extLst>
               </p:nvPr>
@@ -24651,7 +24864,7 @@
                         <a:blipFill>
                           <a:blip r:embed="rId3"/>
                           <a:stretch>
-                            <a:fillRect t="-8333" b="-1061111"/>
+                            <a:fillRect t="-10667" r="-100" b="-1061333"/>
                           </a:stretch>
                         </a:blipFill>
                       </a:tcPr>
@@ -24790,7 +25003,7 @@
                         <a:blipFill>
                           <a:blip r:embed="rId3"/>
                           <a:stretch>
-                            <a:fillRect l="-70515" t="-10372" b="-1596"/>
+                            <a:fillRect l="-70503" t="-10627" r="-171" b="-1921"/>
                           </a:stretch>
                         </a:blipFill>
                       </a:tcPr>
@@ -24809,7 +25022,7 @@
       </mc:AlternateContent>
       <p:graphicFrame>
         <p:nvGraphicFramePr>
-          <p:cNvPr id="4" name="Table 3">
+          <p:cNvPr id="20" name="Table 19">
             <a:extLst>
               <a:ext uri="{FF2B5EF4-FFF2-40B4-BE49-F238E27FC236}">
                 <a16:creationId xmlns:a16="http://schemas.microsoft.com/office/drawing/2014/main" id="{540BC5F5-3CBB-3C43-ACE9-142DD19D098F}"/>
@@ -24819,7 +25032,13 @@
           <p:cNvGraphicFramePr>
             <a:graphicFrameLocks noGrp="1"/>
           </p:cNvGraphicFramePr>
-          <p:nvPr/>
+          <p:nvPr>
+            <p:extLst>
+              <p:ext uri="{D42A27DB-BD31-4B8C-83A1-F6EECF244321}">
+                <p14:modId xmlns:p14="http://schemas.microsoft.com/office/powerpoint/2010/main" val="3437429520"/>
+              </p:ext>
+            </p:extLst>
+          </p:nvPr>
         </p:nvGraphicFramePr>
         <p:xfrm>
           <a:off x="1672772" y="915609"/>
@@ -24855,47 +25074,6 @@
                 </a:gridCol>
               </a:tblGrid>
               <a:tr h="370840">
-                <a:tc gridSpan="3">
-                  <a:txBody>
-                    <a:bodyPr/>
-                    <a:lstStyle/>
-                    <a:p>
-                      <a:r>
-                        <a:rPr lang="en-US" dirty="0"/>
-                        <a:t>pivots</a:t>
-                      </a:r>
-                      <a:endParaRPr lang="ru-RU" dirty="0"/>
-                    </a:p>
-                  </a:txBody>
-                  <a:tcPr/>
-                </a:tc>
-                <a:tc hMerge="1">
-                  <a:txBody>
-                    <a:bodyPr/>
-                    <a:lstStyle/>
-                    <a:p>
-                      <a:endParaRPr lang="ru-RU"/>
-                    </a:p>
-                  </a:txBody>
-                  <a:tcPr/>
-                </a:tc>
-                <a:tc hMerge="1">
-                  <a:txBody>
-                    <a:bodyPr/>
-                    <a:lstStyle/>
-                    <a:p>
-                      <a:endParaRPr lang="ru-RU"/>
-                    </a:p>
-                  </a:txBody>
-                  <a:tcPr/>
-                </a:tc>
-                <a:extLst>
-                  <a:ext uri="{0D108BD9-81ED-4DB2-BD59-A6C34878D82A}">
-                    <a16:rowId xmlns:a16="http://schemas.microsoft.com/office/drawing/2014/main" val="2904599238"/>
-                  </a:ext>
-                </a:extLst>
-              </a:tr>
-              <a:tr h="370840">
                 <a:tc>
                   <a:txBody>
                     <a:bodyPr/>
@@ -24920,7 +25098,7 @@
                   </a:txBody>
                   <a:tcPr>
                     <a:solidFill>
-                      <a:srgbClr val="FF0000"/>
+                      <a:srgbClr val="C00000"/>
                     </a:solidFill>
                   </a:tcPr>
                 </a:tc>
@@ -24940,13 +25118,60 @@
                   </a:ext>
                 </a:extLst>
               </a:tr>
+              <a:tr h="370840">
+                <a:tc gridSpan="3">
+                  <a:txBody>
+                    <a:bodyPr/>
+                    <a:lstStyle/>
+                    <a:p>
+                      <a:r>
+                        <a:rPr lang="en-US" dirty="0" smtClean="0"/>
+                        <a:t>pivots</a:t>
+                      </a:r>
+                      <a:endParaRPr lang="ru-RU" dirty="0"/>
+                    </a:p>
+                  </a:txBody>
+                  <a:tcPr>
+                    <a:noFill/>
+                  </a:tcPr>
+                </a:tc>
+                <a:tc hMerge="1">
+                  <a:txBody>
+                    <a:bodyPr/>
+                    <a:lstStyle/>
+                    <a:p>
+                      <a:endParaRPr lang="ru-RU" dirty="0"/>
+                    </a:p>
+                  </a:txBody>
+                  <a:tcPr>
+                    <a:solidFill>
+                      <a:srgbClr val="C00000"/>
+                    </a:solidFill>
+                  </a:tcPr>
+                </a:tc>
+                <a:tc hMerge="1">
+                  <a:txBody>
+                    <a:bodyPr/>
+                    <a:lstStyle/>
+                    <a:p>
+                      <a:endParaRPr lang="ru-RU" dirty="0"/>
+                    </a:p>
+                  </a:txBody>
+                  <a:tcPr/>
+                </a:tc>
+                <a:extLst>
+                  <a:ext uri="{0D108BD9-81ED-4DB2-BD59-A6C34878D82A}">
+                    <a16:rowId xmlns:a16="http://schemas.microsoft.com/office/drawing/2014/main" val="542067439"/>
+                  </a:ext>
+                </a:extLst>
+              </a:tr>
             </a:tbl>
           </a:graphicData>
         </a:graphic>
       </p:graphicFrame>
       <p:graphicFrame>
         <p:nvGraphicFramePr>
-          <p:cNvPr id="7" name="Table 6">
+          <p:cNvPr id="22" name="Table 21">
             <a:extLst>
               <a:ext uri="{FF2B5EF4-FFF2-40B4-BE49-F238E27FC236}">
                 <a16:creationId xmlns:a16="http://schemas.microsoft.com/office/drawing/2014/main" id="{2A4B87A2-6BF6-334D-B575-78F25403D403}"/>
@@ -24956,7 +25181,13 @@
           <p:cNvGraphicFramePr>
             <a:graphicFrameLocks noGrp="1"/>
           </p:cNvGraphicFramePr>
-          <p:nvPr/>
+          <p:nvPr>
+            <p:extLst>
+              <p:ext uri="{D42A27DB-BD31-4B8C-83A1-F6EECF244321}">
+                <p14:modId xmlns:p14="http://schemas.microsoft.com/office/powerpoint/2010/main" val="3244199746"/>
+              </p:ext>
+            </p:extLst>
+          </p:nvPr>
         </p:nvGraphicFramePr>
         <p:xfrm>
           <a:off x="246743" y="1993294"/>
@@ -24984,8 +25215,8 @@
                     <a:lstStyle/>
                     <a:p>
                       <a:r>
-                        <a:rPr lang="en-US" dirty="0"/>
-                        <a:t>pivots</a:t>
+                        <a:rPr lang="en-US" dirty="0" smtClean="0"/>
+                        <a:t>commands</a:t>
                       </a:r>
                       <a:endParaRPr lang="ru-RU" dirty="0"/>
                     </a:p>
@@ -25005,8 +25236,8 @@
                     <a:lstStyle/>
                     <a:p>
                       <a:r>
-                        <a:rPr lang="en-US" dirty="0"/>
-                        <a:t>commands</a:t>
+                        <a:rPr lang="en-US" dirty="0" smtClean="0"/>
+                        <a:t>pivots</a:t>
                       </a:r>
                       <a:endParaRPr lang="ru-RU" dirty="0"/>
                     </a:p>
@@ -25025,7 +25256,7 @@
       </p:graphicFrame>
       <p:graphicFrame>
         <p:nvGraphicFramePr>
-          <p:cNvPr id="8" name="Table 7">
+          <p:cNvPr id="23" name="Table 22">
             <a:extLst>
               <a:ext uri="{FF2B5EF4-FFF2-40B4-BE49-F238E27FC236}">
                 <a16:creationId xmlns:a16="http://schemas.microsoft.com/office/drawing/2014/main" id="{4477A714-9D80-3B43-A7C9-3FA93857301E}"/>
@@ -25035,7 +25266,13 @@
           <p:cNvGraphicFramePr>
             <a:graphicFrameLocks noGrp="1"/>
           </p:cNvGraphicFramePr>
-          <p:nvPr/>
+          <p:nvPr>
+            <p:extLst>
+              <p:ext uri="{D42A27DB-BD31-4B8C-83A1-F6EECF244321}">
+                <p14:modId xmlns:p14="http://schemas.microsoft.com/office/powerpoint/2010/main" val="3165867744"/>
+              </p:ext>
+            </p:extLst>
+          </p:nvPr>
         </p:nvGraphicFramePr>
         <p:xfrm>
           <a:off x="1672772" y="1977535"/>
@@ -25063,8 +25300,8 @@
                     <a:lstStyle/>
                     <a:p>
                       <a:r>
-                        <a:rPr lang="en-US" dirty="0"/>
-                        <a:t>pivots</a:t>
+                        <a:rPr lang="en-US" dirty="0" smtClean="0"/>
+                        <a:t>commands</a:t>
                       </a:r>
                       <a:endParaRPr lang="ru-RU" dirty="0"/>
                     </a:p>
@@ -25084,8 +25321,8 @@
                     <a:lstStyle/>
                     <a:p>
                       <a:r>
-                        <a:rPr lang="en-US" dirty="0"/>
-                        <a:t>commands</a:t>
+                        <a:rPr lang="en-US" dirty="0" smtClean="0"/>
+                        <a:t>pivots</a:t>
                       </a:r>
                       <a:endParaRPr lang="ru-RU" dirty="0"/>
                     </a:p>
@@ -25104,7 +25341,7 @@
       </p:graphicFrame>
       <p:graphicFrame>
         <p:nvGraphicFramePr>
-          <p:cNvPr id="9" name="Table 8">
+          <p:cNvPr id="25" name="Table 24">
             <a:extLst>
               <a:ext uri="{FF2B5EF4-FFF2-40B4-BE49-F238E27FC236}">
                 <a16:creationId xmlns:a16="http://schemas.microsoft.com/office/drawing/2014/main" id="{56616A28-EA0B-5040-9804-9D852BF9C7F7}"/>
@@ -25114,7 +25351,13 @@
           <p:cNvGraphicFramePr>
             <a:graphicFrameLocks noGrp="1"/>
           </p:cNvGraphicFramePr>
-          <p:nvPr/>
+          <p:nvPr>
+            <p:extLst>
+              <p:ext uri="{D42A27DB-BD31-4B8C-83A1-F6EECF244321}">
+                <p14:modId xmlns:p14="http://schemas.microsoft.com/office/powerpoint/2010/main" val="981873522"/>
+              </p:ext>
+            </p:extLst>
+          </p:nvPr>
         </p:nvGraphicFramePr>
         <p:xfrm>
           <a:off x="3621314" y="1955763"/>
@@ -25142,8 +25385,8 @@
                     <a:lstStyle/>
                     <a:p>
                       <a:r>
-                        <a:rPr lang="en-US" dirty="0"/>
-                        <a:t>pivots</a:t>
+                        <a:rPr lang="en-US" dirty="0" smtClean="0"/>
+                        <a:t>commands</a:t>
                       </a:r>
                       <a:endParaRPr lang="ru-RU" dirty="0"/>
                     </a:p>
@@ -25163,8 +25406,8 @@
                     <a:lstStyle/>
                     <a:p>
                       <a:r>
-                        <a:rPr lang="en-US" dirty="0"/>
-                        <a:t>commands</a:t>
+                        <a:rPr lang="en-US" dirty="0" smtClean="0"/>
+                        <a:t>pivots</a:t>
                       </a:r>
                       <a:endParaRPr lang="ru-RU" dirty="0"/>
                     </a:p>
@@ -25183,7 +25426,7 @@
       </p:graphicFrame>
       <p:sp>
         <p:nvSpPr>
-          <p:cNvPr id="10" name="TextBox 9">
+          <p:cNvPr id="27" name="TextBox 26">
             <a:extLst>
               <a:ext uri="{FF2B5EF4-FFF2-40B4-BE49-F238E27FC236}">
                 <a16:creationId xmlns:a16="http://schemas.microsoft.com/office/drawing/2014/main" id="{38574764-423C-3D4F-ADFF-3EB0A75A1936}"/>
@@ -25219,7 +25462,7 @@
       </p:sp>
       <p:graphicFrame>
         <p:nvGraphicFramePr>
-          <p:cNvPr id="11" name="Table 10">
+          <p:cNvPr id="29" name="Table 28">
             <a:extLst>
               <a:ext uri="{FF2B5EF4-FFF2-40B4-BE49-F238E27FC236}">
                 <a16:creationId xmlns:a16="http://schemas.microsoft.com/office/drawing/2014/main" id="{88538589-9133-BF42-A664-05590C14C1D1}"/>
@@ -25229,7 +25472,13 @@
           <p:cNvGraphicFramePr>
             <a:graphicFrameLocks noGrp="1"/>
           </p:cNvGraphicFramePr>
-          <p:nvPr/>
+          <p:nvPr>
+            <p:extLst>
+              <p:ext uri="{D42A27DB-BD31-4B8C-83A1-F6EECF244321}">
+                <p14:modId xmlns:p14="http://schemas.microsoft.com/office/powerpoint/2010/main" val="1481492408"/>
+              </p:ext>
+            </p:extLst>
+          </p:nvPr>
         </p:nvGraphicFramePr>
         <p:xfrm>
           <a:off x="246743" y="3425578"/>
@@ -25257,8 +25506,8 @@
                     <a:lstStyle/>
                     <a:p>
                       <a:r>
-                        <a:rPr lang="en-US" dirty="0"/>
-                        <a:t>pivots</a:t>
+                        <a:rPr lang="en-US" dirty="0" smtClean="0"/>
+                        <a:t>elements</a:t>
                       </a:r>
                       <a:endParaRPr lang="ru-RU" dirty="0"/>
                     </a:p>
@@ -25277,7 +25526,7 @@
       </p:graphicFrame>
       <p:cxnSp>
         <p:nvCxnSpPr>
-          <p:cNvPr id="13" name="Straight Arrow Connector 12">
+          <p:cNvPr id="30" name="Straight Arrow Connector 29">
             <a:extLst>
               <a:ext uri="{FF2B5EF4-FFF2-40B4-BE49-F238E27FC236}">
                 <a16:creationId xmlns:a16="http://schemas.microsoft.com/office/drawing/2014/main" id="{A7876C95-A1ED-FD46-89C3-471D0885A468}"/>
@@ -25285,7 +25534,7 @@
             </a:extLst>
           </p:cNvPr>
           <p:cNvCxnSpPr>
-            <a:endCxn id="7" idx="0"/>
+            <a:endCxn id="22" idx="0"/>
           </p:cNvCxnSpPr>
           <p:nvPr/>
         </p:nvCxnSpPr>
@@ -25321,7 +25570,7 @@
       </p:cxnSp>
       <p:cxnSp>
         <p:nvCxnSpPr>
-          <p:cNvPr id="15" name="Straight Arrow Connector 14">
+          <p:cNvPr id="31" name="Straight Arrow Connector 30">
             <a:extLst>
               <a:ext uri="{FF2B5EF4-FFF2-40B4-BE49-F238E27FC236}">
                 <a16:creationId xmlns:a16="http://schemas.microsoft.com/office/drawing/2014/main" id="{8CAF3A44-9089-C54B-9ED7-27E17CF0AA32}"/>
@@ -25329,7 +25578,7 @@
             </a:extLst>
           </p:cNvPr>
           <p:cNvCxnSpPr>
-            <a:endCxn id="8" idx="0"/>
+            <a:endCxn id="23" idx="0"/>
           </p:cNvCxnSpPr>
           <p:nvPr/>
         </p:nvCxnSpPr>
@@ -25365,7 +25614,7 @@
       </p:cxnSp>
       <p:cxnSp>
         <p:nvCxnSpPr>
-          <p:cNvPr id="17" name="Straight Arrow Connector 16">
+          <p:cNvPr id="33" name="Straight Arrow Connector 32">
             <a:extLst>
               <a:ext uri="{FF2B5EF4-FFF2-40B4-BE49-F238E27FC236}">
                 <a16:creationId xmlns:a16="http://schemas.microsoft.com/office/drawing/2014/main" id="{A3DCF2CF-9BD5-E24F-9347-6F929858C999}"/>
@@ -25407,7 +25656,7 @@
       </p:cxnSp>
       <p:cxnSp>
         <p:nvCxnSpPr>
-          <p:cNvPr id="19" name="Straight Arrow Connector 18">
+          <p:cNvPr id="34" name="Straight Arrow Connector 33">
             <a:extLst>
               <a:ext uri="{FF2B5EF4-FFF2-40B4-BE49-F238E27FC236}">
                 <a16:creationId xmlns:a16="http://schemas.microsoft.com/office/drawing/2014/main" id="{8B50A883-5FE5-5140-9869-F8E784436BEE}"/>
@@ -25449,7 +25698,7 @@
       </p:cxnSp>
       <p:cxnSp>
         <p:nvCxnSpPr>
-          <p:cNvPr id="21" name="Straight Arrow Connector 20">
+          <p:cNvPr id="35" name="Straight Arrow Connector 34">
             <a:extLst>
               <a:ext uri="{FF2B5EF4-FFF2-40B4-BE49-F238E27FC236}">
                 <a16:creationId xmlns:a16="http://schemas.microsoft.com/office/drawing/2014/main" id="{7E4633B1-D72D-9743-A4D8-5E3695848B42}"/>
@@ -25458,7 +25707,7 @@
           </p:cNvPr>
           <p:cNvCxnSpPr>
             <a:cxnSpLocks/>
-            <a:endCxn id="9" idx="0"/>
+            <a:endCxn id="25" idx="0"/>
           </p:cNvCxnSpPr>
           <p:nvPr/>
         </p:nvCxnSpPr>
@@ -25494,7 +25743,7 @@
       </p:cxnSp>
       <p:cxnSp>
         <p:nvCxnSpPr>
-          <p:cNvPr id="24" name="Straight Arrow Connector 23">
+          <p:cNvPr id="36" name="Straight Arrow Connector 35">
             <a:extLst>
               <a:ext uri="{FF2B5EF4-FFF2-40B4-BE49-F238E27FC236}">
                 <a16:creationId xmlns:a16="http://schemas.microsoft.com/office/drawing/2014/main" id="{76827C7F-CD48-0943-8AEE-57210ACBD309}"/>
@@ -25503,8 +25752,8 @@
           </p:cNvPr>
           <p:cNvCxnSpPr>
             <a:cxnSpLocks/>
-            <a:stCxn id="7" idx="2"/>
-            <a:endCxn id="11" idx="0"/>
+            <a:stCxn id="22" idx="2"/>
+            <a:endCxn id="29" idx="0"/>
           </p:cNvCxnSpPr>
           <p:nvPr/>
         </p:nvCxnSpPr>
@@ -25540,7 +25789,7 @@
       </p:cxnSp>
       <p:cxnSp>
         <p:nvCxnSpPr>
-          <p:cNvPr id="26" name="Straight Arrow Connector 25">
+          <p:cNvPr id="37" name="Straight Arrow Connector 36">
             <a:extLst>
               <a:ext uri="{FF2B5EF4-FFF2-40B4-BE49-F238E27FC236}">
                 <a16:creationId xmlns:a16="http://schemas.microsoft.com/office/drawing/2014/main" id="{174232A4-8AD0-1746-BBF8-7B95F2C11B55}"/>
@@ -25584,7 +25833,7 @@
       </p:cxnSp>
       <p:cxnSp>
         <p:nvCxnSpPr>
-          <p:cNvPr id="28" name="Straight Arrow Connector 27">
+          <p:cNvPr id="38" name="Straight Arrow Connector 37">
             <a:extLst>
               <a:ext uri="{FF2B5EF4-FFF2-40B4-BE49-F238E27FC236}">
                 <a16:creationId xmlns:a16="http://schemas.microsoft.com/office/drawing/2014/main" id="{CBBE74FE-7A86-BB4C-AB69-0E3D761C5FA5}"/>
@@ -25628,7 +25877,7 @@
       </p:cxnSp>
       <p:sp>
         <p:nvSpPr>
-          <p:cNvPr id="32" name="TextBox 31">
+          <p:cNvPr id="39" name="TextBox 38">
             <a:extLst>
               <a:ext uri="{FF2B5EF4-FFF2-40B4-BE49-F238E27FC236}">
                 <a16:creationId xmlns:a16="http://schemas.microsoft.com/office/drawing/2014/main" id="{602F302C-5C3C-CA40-9EE6-2D6DAC43FC4E}"/>

</xml_diff>